<commit_message>
Update ABP Comm Talks 2023.4.pptx
</commit_message>
<xml_diff>
--- a/2023-05-30 ABP Community Talks 2023.4/ABP Comm Talks 2023.4.pptx
+++ b/2023-05-30 ABP Community Talks 2023.4/ABP Comm Talks 2023.4.pptx
@@ -6,14 +6,20 @@
   </p:sldMasterIdLst>
   <p:sldIdLst>
     <p:sldId id="256" r:id="rId2"/>
-    <p:sldId id="257" r:id="rId3"/>
-    <p:sldId id="258" r:id="rId4"/>
-    <p:sldId id="259" r:id="rId5"/>
-    <p:sldId id="260" r:id="rId6"/>
-    <p:sldId id="261" r:id="rId7"/>
-    <p:sldId id="262" r:id="rId8"/>
-    <p:sldId id="263" r:id="rId9"/>
-    <p:sldId id="264" r:id="rId10"/>
+    <p:sldId id="265" r:id="rId3"/>
+    <p:sldId id="257" r:id="rId4"/>
+    <p:sldId id="258" r:id="rId5"/>
+    <p:sldId id="259" r:id="rId6"/>
+    <p:sldId id="260" r:id="rId7"/>
+    <p:sldId id="261" r:id="rId8"/>
+    <p:sldId id="262" r:id="rId9"/>
+    <p:sldId id="263" r:id="rId10"/>
+    <p:sldId id="270" r:id="rId11"/>
+    <p:sldId id="269" r:id="rId12"/>
+    <p:sldId id="264" r:id="rId13"/>
+    <p:sldId id="266" r:id="rId14"/>
+    <p:sldId id="271" r:id="rId15"/>
+    <p:sldId id="272" r:id="rId16"/>
   </p:sldIdLst>
   <p:sldSz cx="12192000" cy="6858000"/>
   <p:notesSz cx="6858000" cy="9144000"/>
@@ -3457,6 +3463,1502 @@
 </p:sld>
 </file>
 
+<file path=ppt/slides/slide10.xml><?xml version="1.0" encoding="utf-8"?>
+<p:sld xmlns:a="http://schemas.openxmlformats.org/drawingml/2006/main" xmlns:r="http://schemas.openxmlformats.org/officeDocument/2006/relationships" xmlns:p="http://schemas.openxmlformats.org/presentationml/2006/main">
+  <p:cSld>
+    <p:bg>
+      <p:bgPr>
+        <a:blipFill dpi="0" rotWithShape="1">
+          <a:blip r:embed="rId2">
+            <a:lum/>
+          </a:blip>
+          <a:srcRect/>
+          <a:stretch>
+            <a:fillRect/>
+          </a:stretch>
+        </a:blipFill>
+        <a:effectLst/>
+      </p:bgPr>
+    </p:bg>
+    <p:spTree>
+      <p:nvGrpSpPr>
+        <p:cNvPr id="1" name=""/>
+        <p:cNvGrpSpPr/>
+        <p:nvPr/>
+      </p:nvGrpSpPr>
+      <p:grpSpPr>
+        <a:xfrm>
+          <a:off x="0" y="0"/>
+          <a:ext cx="0" cy="0"/>
+          <a:chOff x="0" y="0"/>
+          <a:chExt cx="0" cy="0"/>
+        </a:xfrm>
+      </p:grpSpPr>
+      <p:sp>
+        <p:nvSpPr>
+          <p:cNvPr id="2" name="Title 1">
+            <a:extLst>
+              <a:ext uri="{FF2B5EF4-FFF2-40B4-BE49-F238E27FC236}">
+                <a16:creationId xmlns:a16="http://schemas.microsoft.com/office/drawing/2014/main" id="{9255DFBE-19DA-408D-84E6-F4043FC30BD3}"/>
+              </a:ext>
+            </a:extLst>
+          </p:cNvPr>
+          <p:cNvSpPr>
+            <a:spLocks noGrp="1"/>
+          </p:cNvSpPr>
+          <p:nvPr>
+            <p:ph type="ctrTitle"/>
+          </p:nvPr>
+        </p:nvSpPr>
+        <p:spPr/>
+        <p:txBody>
+          <a:bodyPr>
+            <a:normAutofit/>
+          </a:bodyPr>
+          <a:lstStyle/>
+          <a:p>
+            <a:r>
+              <a:rPr lang="tr-TR" sz="5400" b="1" dirty="0">
+                <a:solidFill>
+                  <a:srgbClr val="292D33"/>
+                </a:solidFill>
+                <a:latin typeface="Euclid Circular B" panose="020B0504000000000000" pitchFamily="34" charset="0"/>
+                <a:ea typeface="Euclid Circular B" panose="020B0504000000000000" pitchFamily="34" charset="0"/>
+              </a:rPr>
+              <a:t>ABP Commercial News</a:t>
+            </a:r>
+            <a:endParaRPr lang="en-US" sz="5400" b="1" dirty="0">
+              <a:solidFill>
+                <a:srgbClr val="C00000"/>
+              </a:solidFill>
+              <a:latin typeface="Euclid Circular B" panose="020B0504000000000000" pitchFamily="34" charset="0"/>
+              <a:ea typeface="Euclid Circular B" panose="020B0504000000000000" pitchFamily="34" charset="0"/>
+            </a:endParaRPr>
+          </a:p>
+        </p:txBody>
+      </p:sp>
+    </p:spTree>
+    <p:extLst>
+      <p:ext uri="{BB962C8B-B14F-4D97-AF65-F5344CB8AC3E}">
+        <p14:creationId xmlns:p14="http://schemas.microsoft.com/office/powerpoint/2010/main" val="2087730107"/>
+      </p:ext>
+    </p:extLst>
+  </p:cSld>
+  <p:clrMapOvr>
+    <a:masterClrMapping/>
+  </p:clrMapOvr>
+</p:sld>
+</file>
+
+<file path=ppt/slides/slide11.xml><?xml version="1.0" encoding="utf-8"?>
+<p:sld xmlns:a="http://schemas.openxmlformats.org/drawingml/2006/main" xmlns:r="http://schemas.openxmlformats.org/officeDocument/2006/relationships" xmlns:p="http://schemas.openxmlformats.org/presentationml/2006/main">
+  <p:cSld>
+    <p:spTree>
+      <p:nvGrpSpPr>
+        <p:cNvPr id="1" name=""/>
+        <p:cNvGrpSpPr/>
+        <p:nvPr/>
+      </p:nvGrpSpPr>
+      <p:grpSpPr>
+        <a:xfrm>
+          <a:off x="0" y="0"/>
+          <a:ext cx="0" cy="0"/>
+          <a:chOff x="0" y="0"/>
+          <a:chExt cx="0" cy="0"/>
+        </a:xfrm>
+      </p:grpSpPr>
+      <p:sp>
+        <p:nvSpPr>
+          <p:cNvPr id="2" name="Title 1">
+            <a:extLst>
+              <a:ext uri="{FF2B5EF4-FFF2-40B4-BE49-F238E27FC236}">
+                <a16:creationId xmlns:a16="http://schemas.microsoft.com/office/drawing/2014/main" id="{55E11F08-6CA0-48F1-AD67-97430DDA07F0}"/>
+              </a:ext>
+            </a:extLst>
+          </p:cNvPr>
+          <p:cNvSpPr>
+            <a:spLocks noGrp="1"/>
+          </p:cNvSpPr>
+          <p:nvPr>
+            <p:ph type="title"/>
+          </p:nvPr>
+        </p:nvSpPr>
+        <p:spPr/>
+        <p:txBody>
+          <a:bodyPr/>
+          <a:lstStyle/>
+          <a:p>
+            <a:r>
+              <a:rPr lang="tr-TR" b="1" dirty="0">
+                <a:solidFill>
+                  <a:srgbClr val="292D33"/>
+                </a:solidFill>
+                <a:latin typeface="Euclid Circular B" panose="020B0504000000000000" pitchFamily="34" charset="0"/>
+                <a:ea typeface="Euclid Circular B" panose="020B0504000000000000" pitchFamily="34" charset="0"/>
+              </a:rPr>
+              <a:t>The ABP Studio</a:t>
+            </a:r>
+            <a:endParaRPr lang="en-US" b="1" dirty="0">
+              <a:solidFill>
+                <a:srgbClr val="292D33"/>
+              </a:solidFill>
+              <a:latin typeface="Euclid Circular B" panose="020B0504000000000000" pitchFamily="34" charset="0"/>
+              <a:ea typeface="Euclid Circular B" panose="020B0504000000000000" pitchFamily="34" charset="0"/>
+            </a:endParaRPr>
+          </a:p>
+        </p:txBody>
+      </p:sp>
+      <p:sp>
+        <p:nvSpPr>
+          <p:cNvPr id="3" name="Content Placeholder 2">
+            <a:extLst>
+              <a:ext uri="{FF2B5EF4-FFF2-40B4-BE49-F238E27FC236}">
+                <a16:creationId xmlns:a16="http://schemas.microsoft.com/office/drawing/2014/main" id="{891C7693-D3DF-4635-96F4-97F3B4136FDF}"/>
+              </a:ext>
+            </a:extLst>
+          </p:cNvPr>
+          <p:cNvSpPr>
+            <a:spLocks noGrp="1"/>
+          </p:cNvSpPr>
+          <p:nvPr>
+            <p:ph idx="1"/>
+          </p:nvPr>
+        </p:nvSpPr>
+        <p:spPr/>
+        <p:txBody>
+          <a:bodyPr>
+            <a:normAutofit fontScale="92500" lnSpcReduction="10000"/>
+          </a:bodyPr>
+          <a:lstStyle/>
+          <a:p>
+            <a:pPr marL="0" indent="0">
+              <a:buNone/>
+            </a:pPr>
+            <a:r>
+              <a:rPr lang="tr-TR" dirty="0">
+                <a:latin typeface="Euclid Circular B" panose="020B0504000000000000" pitchFamily="34" charset="0"/>
+                <a:ea typeface="Euclid Circular B" panose="020B0504000000000000" pitchFamily="34" charset="0"/>
+              </a:rPr>
+              <a:t>An ABP-integrated desktop application for ABP developers.</a:t>
+            </a:r>
+          </a:p>
+          <a:p>
+            <a:pPr marL="0" indent="0">
+              <a:buNone/>
+            </a:pPr>
+            <a:r>
+              <a:rPr lang="tr-TR" b="1" dirty="0">
+                <a:latin typeface="Euclid Circular B" panose="020B0504000000000000" pitchFamily="34" charset="0"/>
+                <a:ea typeface="Euclid Circular B" panose="020B0504000000000000" pitchFamily="34" charset="0"/>
+              </a:rPr>
+              <a:t>Planned release date</a:t>
+            </a:r>
+            <a:r>
+              <a:rPr lang="tr-TR" dirty="0">
+                <a:latin typeface="Euclid Circular B" panose="020B0504000000000000" pitchFamily="34" charset="0"/>
+                <a:ea typeface="Euclid Circular B" panose="020B0504000000000000" pitchFamily="34" charset="0"/>
+              </a:rPr>
+              <a:t>: Q3 of 2023.</a:t>
+            </a:r>
+            <a:br>
+              <a:rPr lang="tr-TR" dirty="0">
+                <a:latin typeface="Euclid Circular B" panose="020B0504000000000000" pitchFamily="34" charset="0"/>
+                <a:ea typeface="Euclid Circular B" panose="020B0504000000000000" pitchFamily="34" charset="0"/>
+              </a:rPr>
+            </a:br>
+            <a:endParaRPr lang="tr-TR" dirty="0">
+              <a:latin typeface="Euclid Circular B" panose="020B0504000000000000" pitchFamily="34" charset="0"/>
+              <a:ea typeface="Euclid Circular B" panose="020B0504000000000000" pitchFamily="34" charset="0"/>
+            </a:endParaRPr>
+          </a:p>
+          <a:p>
+            <a:pPr marL="0" indent="0">
+              <a:buNone/>
+            </a:pPr>
+            <a:r>
+              <a:rPr lang="tr-TR" b="1" u="sng" dirty="0">
+                <a:latin typeface="Euclid Circular B" panose="020B0504000000000000" pitchFamily="34" charset="0"/>
+                <a:ea typeface="Euclid Circular B" panose="020B0504000000000000" pitchFamily="34" charset="0"/>
+              </a:rPr>
+              <a:t>Initial Features:</a:t>
+            </a:r>
+          </a:p>
+          <a:p>
+            <a:r>
+              <a:rPr lang="tr-TR" b="1" dirty="0">
+                <a:latin typeface="Euclid Circular B" panose="020B0504000000000000" pitchFamily="34" charset="0"/>
+                <a:ea typeface="Euclid Circular B" panose="020B0504000000000000" pitchFamily="34" charset="0"/>
+              </a:rPr>
+              <a:t>Create </a:t>
+            </a:r>
+            <a:r>
+              <a:rPr lang="tr-TR" dirty="0">
+                <a:latin typeface="Euclid Circular B" panose="020B0504000000000000" pitchFamily="34" charset="0"/>
+                <a:ea typeface="Euclid Circular B" panose="020B0504000000000000" pitchFamily="34" charset="0"/>
+              </a:rPr>
+              <a:t>new solutions &amp; modules</a:t>
+            </a:r>
+          </a:p>
+          <a:p>
+            <a:r>
+              <a:rPr lang="tr-TR" b="1" dirty="0">
+                <a:latin typeface="Euclid Circular B" panose="020B0504000000000000" pitchFamily="34" charset="0"/>
+                <a:ea typeface="Euclid Circular B" panose="020B0504000000000000" pitchFamily="34" charset="0"/>
+              </a:rPr>
+              <a:t>Install</a:t>
+            </a:r>
+            <a:r>
+              <a:rPr lang="tr-TR" dirty="0">
+                <a:latin typeface="Euclid Circular B" panose="020B0504000000000000" pitchFamily="34" charset="0"/>
+                <a:ea typeface="Euclid Circular B" panose="020B0504000000000000" pitchFamily="34" charset="0"/>
+              </a:rPr>
+              <a:t>/uninstall modules</a:t>
+            </a:r>
+          </a:p>
+          <a:p>
+            <a:r>
+              <a:rPr lang="tr-TR" b="1" dirty="0">
+                <a:latin typeface="Euclid Circular B" panose="020B0504000000000000" pitchFamily="34" charset="0"/>
+                <a:ea typeface="Euclid Circular B" panose="020B0504000000000000" pitchFamily="34" charset="0"/>
+              </a:rPr>
+              <a:t>Explore </a:t>
+            </a:r>
+            <a:r>
+              <a:rPr lang="tr-TR" dirty="0">
+                <a:latin typeface="Euclid Circular B" panose="020B0504000000000000" pitchFamily="34" charset="0"/>
+                <a:ea typeface="Euclid Circular B" panose="020B0504000000000000" pitchFamily="34" charset="0"/>
+              </a:rPr>
+              <a:t>your solution and used modules in a high-level view</a:t>
+            </a:r>
+          </a:p>
+          <a:p>
+            <a:r>
+              <a:rPr lang="tr-TR" b="1" dirty="0">
+                <a:latin typeface="Euclid Circular B" panose="020B0504000000000000" pitchFamily="34" charset="0"/>
+                <a:ea typeface="Euclid Circular B" panose="020B0504000000000000" pitchFamily="34" charset="0"/>
+              </a:rPr>
+              <a:t>Build </a:t>
+            </a:r>
+            <a:r>
+              <a:rPr lang="tr-TR" dirty="0">
+                <a:latin typeface="Euclid Circular B" panose="020B0504000000000000" pitchFamily="34" charset="0"/>
+                <a:ea typeface="Euclid Circular B" panose="020B0504000000000000" pitchFamily="34" charset="0"/>
+              </a:rPr>
+              <a:t>monolith-modular and microservice solution structures easier</a:t>
+            </a:r>
+          </a:p>
+          <a:p>
+            <a:r>
+              <a:rPr lang="tr-TR" b="1" dirty="0">
+                <a:latin typeface="Euclid Circular B" panose="020B0504000000000000" pitchFamily="34" charset="0"/>
+                <a:ea typeface="Euclid Circular B" panose="020B0504000000000000" pitchFamily="34" charset="0"/>
+              </a:rPr>
+              <a:t>Run </a:t>
+            </a:r>
+            <a:r>
+              <a:rPr lang="tr-TR" dirty="0">
+                <a:latin typeface="Euclid Circular B" panose="020B0504000000000000" pitchFamily="34" charset="0"/>
+                <a:ea typeface="Euclid Circular B" panose="020B0504000000000000" pitchFamily="34" charset="0"/>
+              </a:rPr>
+              <a:t>multi-application / microservice solutions easily</a:t>
+            </a:r>
+          </a:p>
+          <a:p>
+            <a:r>
+              <a:rPr lang="tr-TR" b="1" dirty="0">
+                <a:latin typeface="Euclid Circular B" panose="020B0504000000000000" pitchFamily="34" charset="0"/>
+                <a:ea typeface="Euclid Circular B" panose="020B0504000000000000" pitchFamily="34" charset="0"/>
+              </a:rPr>
+              <a:t>Kubernetes-integrated</a:t>
+            </a:r>
+            <a:r>
+              <a:rPr lang="tr-TR" dirty="0">
+                <a:latin typeface="Euclid Circular B" panose="020B0504000000000000" pitchFamily="34" charset="0"/>
+                <a:ea typeface="Euclid Circular B" panose="020B0504000000000000" pitchFamily="34" charset="0"/>
+              </a:rPr>
+              <a:t> development environment</a:t>
+            </a:r>
+          </a:p>
+          <a:p>
+            <a:endParaRPr lang="en-US" dirty="0">
+              <a:latin typeface="Euclid Circular B" panose="020B0504000000000000" pitchFamily="34" charset="0"/>
+              <a:ea typeface="Euclid Circular B" panose="020B0504000000000000" pitchFamily="34" charset="0"/>
+            </a:endParaRPr>
+          </a:p>
+        </p:txBody>
+      </p:sp>
+    </p:spTree>
+    <p:extLst>
+      <p:ext uri="{BB962C8B-B14F-4D97-AF65-F5344CB8AC3E}">
+        <p14:creationId xmlns:p14="http://schemas.microsoft.com/office/powerpoint/2010/main" val="1222627661"/>
+      </p:ext>
+    </p:extLst>
+  </p:cSld>
+  <p:clrMapOvr>
+    <a:masterClrMapping/>
+  </p:clrMapOvr>
+  <p:timing>
+    <p:tnLst>
+      <p:par>
+        <p:cTn id="1" dur="indefinite" restart="never" nodeType="tmRoot">
+          <p:childTnLst>
+            <p:seq concurrent="1" nextAc="seek">
+              <p:cTn id="2" dur="indefinite" nodeType="mainSeq">
+                <p:childTnLst>
+                  <p:par>
+                    <p:cTn id="3" fill="hold">
+                      <p:stCondLst>
+                        <p:cond delay="indefinite"/>
+                      </p:stCondLst>
+                      <p:childTnLst>
+                        <p:par>
+                          <p:cTn id="4" fill="hold">
+                            <p:stCondLst>
+                              <p:cond delay="0"/>
+                            </p:stCondLst>
+                            <p:childTnLst>
+                              <p:par>
+                                <p:cTn id="5" presetID="10" presetClass="entr" presetSubtype="0" fill="hold" nodeType="clickEffect">
+                                  <p:stCondLst>
+                                    <p:cond delay="0"/>
+                                  </p:stCondLst>
+                                  <p:childTnLst>
+                                    <p:set>
+                                      <p:cBhvr>
+                                        <p:cTn id="6" dur="1" fill="hold">
+                                          <p:stCondLst>
+                                            <p:cond delay="0"/>
+                                          </p:stCondLst>
+                                        </p:cTn>
+                                        <p:tgtEl>
+                                          <p:spTgt spid="3">
+                                            <p:txEl>
+                                              <p:pRg st="1" end="1"/>
+                                            </p:txEl>
+                                          </p:spTgt>
+                                        </p:tgtEl>
+                                        <p:attrNameLst>
+                                          <p:attrName>style.visibility</p:attrName>
+                                        </p:attrNameLst>
+                                      </p:cBhvr>
+                                      <p:to>
+                                        <p:strVal val="visible"/>
+                                      </p:to>
+                                    </p:set>
+                                    <p:animEffect transition="in" filter="fade">
+                                      <p:cBhvr>
+                                        <p:cTn id="7" dur="500"/>
+                                        <p:tgtEl>
+                                          <p:spTgt spid="3">
+                                            <p:txEl>
+                                              <p:pRg st="1" end="1"/>
+                                            </p:txEl>
+                                          </p:spTgt>
+                                        </p:tgtEl>
+                                      </p:cBhvr>
+                                    </p:animEffect>
+                                  </p:childTnLst>
+                                </p:cTn>
+                              </p:par>
+                            </p:childTnLst>
+                          </p:cTn>
+                        </p:par>
+                      </p:childTnLst>
+                    </p:cTn>
+                  </p:par>
+                  <p:par>
+                    <p:cTn id="8" fill="hold">
+                      <p:stCondLst>
+                        <p:cond delay="indefinite"/>
+                      </p:stCondLst>
+                      <p:childTnLst>
+                        <p:par>
+                          <p:cTn id="9" fill="hold">
+                            <p:stCondLst>
+                              <p:cond delay="0"/>
+                            </p:stCondLst>
+                            <p:childTnLst>
+                              <p:par>
+                                <p:cTn id="10" presetID="10" presetClass="entr" presetSubtype="0" fill="hold" nodeType="clickEffect">
+                                  <p:stCondLst>
+                                    <p:cond delay="0"/>
+                                  </p:stCondLst>
+                                  <p:childTnLst>
+                                    <p:set>
+                                      <p:cBhvr>
+                                        <p:cTn id="11" dur="1" fill="hold">
+                                          <p:stCondLst>
+                                            <p:cond delay="0"/>
+                                          </p:stCondLst>
+                                        </p:cTn>
+                                        <p:tgtEl>
+                                          <p:spTgt spid="3">
+                                            <p:txEl>
+                                              <p:pRg st="2" end="2"/>
+                                            </p:txEl>
+                                          </p:spTgt>
+                                        </p:tgtEl>
+                                        <p:attrNameLst>
+                                          <p:attrName>style.visibility</p:attrName>
+                                        </p:attrNameLst>
+                                      </p:cBhvr>
+                                      <p:to>
+                                        <p:strVal val="visible"/>
+                                      </p:to>
+                                    </p:set>
+                                    <p:animEffect transition="in" filter="fade">
+                                      <p:cBhvr>
+                                        <p:cTn id="12" dur="500"/>
+                                        <p:tgtEl>
+                                          <p:spTgt spid="3">
+                                            <p:txEl>
+                                              <p:pRg st="2" end="2"/>
+                                            </p:txEl>
+                                          </p:spTgt>
+                                        </p:tgtEl>
+                                      </p:cBhvr>
+                                    </p:animEffect>
+                                  </p:childTnLst>
+                                </p:cTn>
+                              </p:par>
+                            </p:childTnLst>
+                          </p:cTn>
+                        </p:par>
+                      </p:childTnLst>
+                    </p:cTn>
+                  </p:par>
+                  <p:par>
+                    <p:cTn id="13" fill="hold">
+                      <p:stCondLst>
+                        <p:cond delay="indefinite"/>
+                      </p:stCondLst>
+                      <p:childTnLst>
+                        <p:par>
+                          <p:cTn id="14" fill="hold">
+                            <p:stCondLst>
+                              <p:cond delay="0"/>
+                            </p:stCondLst>
+                            <p:childTnLst>
+                              <p:par>
+                                <p:cTn id="15" presetID="10" presetClass="entr" presetSubtype="0" fill="hold" nodeType="clickEffect">
+                                  <p:stCondLst>
+                                    <p:cond delay="0"/>
+                                  </p:stCondLst>
+                                  <p:childTnLst>
+                                    <p:set>
+                                      <p:cBhvr>
+                                        <p:cTn id="16" dur="1" fill="hold">
+                                          <p:stCondLst>
+                                            <p:cond delay="0"/>
+                                          </p:stCondLst>
+                                        </p:cTn>
+                                        <p:tgtEl>
+                                          <p:spTgt spid="3">
+                                            <p:txEl>
+                                              <p:pRg st="3" end="3"/>
+                                            </p:txEl>
+                                          </p:spTgt>
+                                        </p:tgtEl>
+                                        <p:attrNameLst>
+                                          <p:attrName>style.visibility</p:attrName>
+                                        </p:attrNameLst>
+                                      </p:cBhvr>
+                                      <p:to>
+                                        <p:strVal val="visible"/>
+                                      </p:to>
+                                    </p:set>
+                                    <p:animEffect transition="in" filter="fade">
+                                      <p:cBhvr>
+                                        <p:cTn id="17" dur="500"/>
+                                        <p:tgtEl>
+                                          <p:spTgt spid="3">
+                                            <p:txEl>
+                                              <p:pRg st="3" end="3"/>
+                                            </p:txEl>
+                                          </p:spTgt>
+                                        </p:tgtEl>
+                                      </p:cBhvr>
+                                    </p:animEffect>
+                                  </p:childTnLst>
+                                </p:cTn>
+                              </p:par>
+                            </p:childTnLst>
+                          </p:cTn>
+                        </p:par>
+                      </p:childTnLst>
+                    </p:cTn>
+                  </p:par>
+                  <p:par>
+                    <p:cTn id="18" fill="hold">
+                      <p:stCondLst>
+                        <p:cond delay="indefinite"/>
+                      </p:stCondLst>
+                      <p:childTnLst>
+                        <p:par>
+                          <p:cTn id="19" fill="hold">
+                            <p:stCondLst>
+                              <p:cond delay="0"/>
+                            </p:stCondLst>
+                            <p:childTnLst>
+                              <p:par>
+                                <p:cTn id="20" presetID="10" presetClass="entr" presetSubtype="0" fill="hold" nodeType="clickEffect">
+                                  <p:stCondLst>
+                                    <p:cond delay="0"/>
+                                  </p:stCondLst>
+                                  <p:childTnLst>
+                                    <p:set>
+                                      <p:cBhvr>
+                                        <p:cTn id="21" dur="1" fill="hold">
+                                          <p:stCondLst>
+                                            <p:cond delay="0"/>
+                                          </p:stCondLst>
+                                        </p:cTn>
+                                        <p:tgtEl>
+                                          <p:spTgt spid="3">
+                                            <p:txEl>
+                                              <p:pRg st="4" end="4"/>
+                                            </p:txEl>
+                                          </p:spTgt>
+                                        </p:tgtEl>
+                                        <p:attrNameLst>
+                                          <p:attrName>style.visibility</p:attrName>
+                                        </p:attrNameLst>
+                                      </p:cBhvr>
+                                      <p:to>
+                                        <p:strVal val="visible"/>
+                                      </p:to>
+                                    </p:set>
+                                    <p:animEffect transition="in" filter="fade">
+                                      <p:cBhvr>
+                                        <p:cTn id="22" dur="500"/>
+                                        <p:tgtEl>
+                                          <p:spTgt spid="3">
+                                            <p:txEl>
+                                              <p:pRg st="4" end="4"/>
+                                            </p:txEl>
+                                          </p:spTgt>
+                                        </p:tgtEl>
+                                      </p:cBhvr>
+                                    </p:animEffect>
+                                  </p:childTnLst>
+                                </p:cTn>
+                              </p:par>
+                            </p:childTnLst>
+                          </p:cTn>
+                        </p:par>
+                      </p:childTnLst>
+                    </p:cTn>
+                  </p:par>
+                  <p:par>
+                    <p:cTn id="23" fill="hold">
+                      <p:stCondLst>
+                        <p:cond delay="indefinite"/>
+                      </p:stCondLst>
+                      <p:childTnLst>
+                        <p:par>
+                          <p:cTn id="24" fill="hold">
+                            <p:stCondLst>
+                              <p:cond delay="0"/>
+                            </p:stCondLst>
+                            <p:childTnLst>
+                              <p:par>
+                                <p:cTn id="25" presetID="10" presetClass="entr" presetSubtype="0" fill="hold" nodeType="clickEffect">
+                                  <p:stCondLst>
+                                    <p:cond delay="0"/>
+                                  </p:stCondLst>
+                                  <p:childTnLst>
+                                    <p:set>
+                                      <p:cBhvr>
+                                        <p:cTn id="26" dur="1" fill="hold">
+                                          <p:stCondLst>
+                                            <p:cond delay="0"/>
+                                          </p:stCondLst>
+                                        </p:cTn>
+                                        <p:tgtEl>
+                                          <p:spTgt spid="3">
+                                            <p:txEl>
+                                              <p:pRg st="5" end="5"/>
+                                            </p:txEl>
+                                          </p:spTgt>
+                                        </p:tgtEl>
+                                        <p:attrNameLst>
+                                          <p:attrName>style.visibility</p:attrName>
+                                        </p:attrNameLst>
+                                      </p:cBhvr>
+                                      <p:to>
+                                        <p:strVal val="visible"/>
+                                      </p:to>
+                                    </p:set>
+                                    <p:animEffect transition="in" filter="fade">
+                                      <p:cBhvr>
+                                        <p:cTn id="27" dur="500"/>
+                                        <p:tgtEl>
+                                          <p:spTgt spid="3">
+                                            <p:txEl>
+                                              <p:pRg st="5" end="5"/>
+                                            </p:txEl>
+                                          </p:spTgt>
+                                        </p:tgtEl>
+                                      </p:cBhvr>
+                                    </p:animEffect>
+                                  </p:childTnLst>
+                                </p:cTn>
+                              </p:par>
+                            </p:childTnLst>
+                          </p:cTn>
+                        </p:par>
+                      </p:childTnLst>
+                    </p:cTn>
+                  </p:par>
+                  <p:par>
+                    <p:cTn id="28" fill="hold">
+                      <p:stCondLst>
+                        <p:cond delay="indefinite"/>
+                      </p:stCondLst>
+                      <p:childTnLst>
+                        <p:par>
+                          <p:cTn id="29" fill="hold">
+                            <p:stCondLst>
+                              <p:cond delay="0"/>
+                            </p:stCondLst>
+                            <p:childTnLst>
+                              <p:par>
+                                <p:cTn id="30" presetID="10" presetClass="entr" presetSubtype="0" fill="hold" nodeType="clickEffect">
+                                  <p:stCondLst>
+                                    <p:cond delay="0"/>
+                                  </p:stCondLst>
+                                  <p:childTnLst>
+                                    <p:set>
+                                      <p:cBhvr>
+                                        <p:cTn id="31" dur="1" fill="hold">
+                                          <p:stCondLst>
+                                            <p:cond delay="0"/>
+                                          </p:stCondLst>
+                                        </p:cTn>
+                                        <p:tgtEl>
+                                          <p:spTgt spid="3">
+                                            <p:txEl>
+                                              <p:pRg st="6" end="6"/>
+                                            </p:txEl>
+                                          </p:spTgt>
+                                        </p:tgtEl>
+                                        <p:attrNameLst>
+                                          <p:attrName>style.visibility</p:attrName>
+                                        </p:attrNameLst>
+                                      </p:cBhvr>
+                                      <p:to>
+                                        <p:strVal val="visible"/>
+                                      </p:to>
+                                    </p:set>
+                                    <p:animEffect transition="in" filter="fade">
+                                      <p:cBhvr>
+                                        <p:cTn id="32" dur="500"/>
+                                        <p:tgtEl>
+                                          <p:spTgt spid="3">
+                                            <p:txEl>
+                                              <p:pRg st="6" end="6"/>
+                                            </p:txEl>
+                                          </p:spTgt>
+                                        </p:tgtEl>
+                                      </p:cBhvr>
+                                    </p:animEffect>
+                                  </p:childTnLst>
+                                </p:cTn>
+                              </p:par>
+                            </p:childTnLst>
+                          </p:cTn>
+                        </p:par>
+                      </p:childTnLst>
+                    </p:cTn>
+                  </p:par>
+                  <p:par>
+                    <p:cTn id="33" fill="hold">
+                      <p:stCondLst>
+                        <p:cond delay="indefinite"/>
+                      </p:stCondLst>
+                      <p:childTnLst>
+                        <p:par>
+                          <p:cTn id="34" fill="hold">
+                            <p:stCondLst>
+                              <p:cond delay="0"/>
+                            </p:stCondLst>
+                            <p:childTnLst>
+                              <p:par>
+                                <p:cTn id="35" presetID="10" presetClass="entr" presetSubtype="0" fill="hold" nodeType="clickEffect">
+                                  <p:stCondLst>
+                                    <p:cond delay="0"/>
+                                  </p:stCondLst>
+                                  <p:childTnLst>
+                                    <p:set>
+                                      <p:cBhvr>
+                                        <p:cTn id="36" dur="1" fill="hold">
+                                          <p:stCondLst>
+                                            <p:cond delay="0"/>
+                                          </p:stCondLst>
+                                        </p:cTn>
+                                        <p:tgtEl>
+                                          <p:spTgt spid="3">
+                                            <p:txEl>
+                                              <p:pRg st="7" end="7"/>
+                                            </p:txEl>
+                                          </p:spTgt>
+                                        </p:tgtEl>
+                                        <p:attrNameLst>
+                                          <p:attrName>style.visibility</p:attrName>
+                                        </p:attrNameLst>
+                                      </p:cBhvr>
+                                      <p:to>
+                                        <p:strVal val="visible"/>
+                                      </p:to>
+                                    </p:set>
+                                    <p:animEffect transition="in" filter="fade">
+                                      <p:cBhvr>
+                                        <p:cTn id="37" dur="500"/>
+                                        <p:tgtEl>
+                                          <p:spTgt spid="3">
+                                            <p:txEl>
+                                              <p:pRg st="7" end="7"/>
+                                            </p:txEl>
+                                          </p:spTgt>
+                                        </p:tgtEl>
+                                      </p:cBhvr>
+                                    </p:animEffect>
+                                  </p:childTnLst>
+                                </p:cTn>
+                              </p:par>
+                            </p:childTnLst>
+                          </p:cTn>
+                        </p:par>
+                      </p:childTnLst>
+                    </p:cTn>
+                  </p:par>
+                  <p:par>
+                    <p:cTn id="38" fill="hold">
+                      <p:stCondLst>
+                        <p:cond delay="indefinite"/>
+                      </p:stCondLst>
+                      <p:childTnLst>
+                        <p:par>
+                          <p:cTn id="39" fill="hold">
+                            <p:stCondLst>
+                              <p:cond delay="0"/>
+                            </p:stCondLst>
+                            <p:childTnLst>
+                              <p:par>
+                                <p:cTn id="40" presetID="10" presetClass="entr" presetSubtype="0" fill="hold" nodeType="clickEffect">
+                                  <p:stCondLst>
+                                    <p:cond delay="0"/>
+                                  </p:stCondLst>
+                                  <p:childTnLst>
+                                    <p:set>
+                                      <p:cBhvr>
+                                        <p:cTn id="41" dur="1" fill="hold">
+                                          <p:stCondLst>
+                                            <p:cond delay="0"/>
+                                          </p:stCondLst>
+                                        </p:cTn>
+                                        <p:tgtEl>
+                                          <p:spTgt spid="3">
+                                            <p:txEl>
+                                              <p:pRg st="8" end="8"/>
+                                            </p:txEl>
+                                          </p:spTgt>
+                                        </p:tgtEl>
+                                        <p:attrNameLst>
+                                          <p:attrName>style.visibility</p:attrName>
+                                        </p:attrNameLst>
+                                      </p:cBhvr>
+                                      <p:to>
+                                        <p:strVal val="visible"/>
+                                      </p:to>
+                                    </p:set>
+                                    <p:animEffect transition="in" filter="fade">
+                                      <p:cBhvr>
+                                        <p:cTn id="42" dur="500"/>
+                                        <p:tgtEl>
+                                          <p:spTgt spid="3">
+                                            <p:txEl>
+                                              <p:pRg st="8" end="8"/>
+                                            </p:txEl>
+                                          </p:spTgt>
+                                        </p:tgtEl>
+                                      </p:cBhvr>
+                                    </p:animEffect>
+                                  </p:childTnLst>
+                                </p:cTn>
+                              </p:par>
+                            </p:childTnLst>
+                          </p:cTn>
+                        </p:par>
+                      </p:childTnLst>
+                    </p:cTn>
+                  </p:par>
+                </p:childTnLst>
+              </p:cTn>
+              <p:prevCondLst>
+                <p:cond evt="onPrev" delay="0">
+                  <p:tgtEl>
+                    <p:sldTgt/>
+                  </p:tgtEl>
+                </p:cond>
+              </p:prevCondLst>
+              <p:nextCondLst>
+                <p:cond evt="onNext" delay="0">
+                  <p:tgtEl>
+                    <p:sldTgt/>
+                  </p:tgtEl>
+                </p:cond>
+              </p:nextCondLst>
+            </p:seq>
+          </p:childTnLst>
+        </p:cTn>
+      </p:par>
+    </p:tnLst>
+  </p:timing>
+</p:sld>
+</file>
+
+<file path=ppt/slides/slide12.xml><?xml version="1.0" encoding="utf-8"?>
+<p:sld xmlns:a="http://schemas.openxmlformats.org/drawingml/2006/main" xmlns:r="http://schemas.openxmlformats.org/officeDocument/2006/relationships" xmlns:p="http://schemas.openxmlformats.org/presentationml/2006/main">
+  <p:cSld>
+    <p:bg>
+      <p:bgPr>
+        <a:blipFill dpi="0" rotWithShape="1">
+          <a:blip r:embed="rId2">
+            <a:lum/>
+          </a:blip>
+          <a:srcRect/>
+          <a:stretch>
+            <a:fillRect/>
+          </a:stretch>
+        </a:blipFill>
+        <a:effectLst/>
+      </p:bgPr>
+    </p:bg>
+    <p:spTree>
+      <p:nvGrpSpPr>
+        <p:cNvPr id="1" name=""/>
+        <p:cNvGrpSpPr/>
+        <p:nvPr/>
+      </p:nvGrpSpPr>
+      <p:grpSpPr>
+        <a:xfrm>
+          <a:off x="0" y="0"/>
+          <a:ext cx="0" cy="0"/>
+          <a:chOff x="0" y="0"/>
+          <a:chExt cx="0" cy="0"/>
+        </a:xfrm>
+      </p:grpSpPr>
+      <p:sp>
+        <p:nvSpPr>
+          <p:cNvPr id="2" name="Title 1">
+            <a:extLst>
+              <a:ext uri="{FF2B5EF4-FFF2-40B4-BE49-F238E27FC236}">
+                <a16:creationId xmlns:a16="http://schemas.microsoft.com/office/drawing/2014/main" id="{55E11F08-6CA0-48F1-AD67-97430DDA07F0}"/>
+              </a:ext>
+            </a:extLst>
+          </p:cNvPr>
+          <p:cNvSpPr>
+            <a:spLocks noGrp="1"/>
+          </p:cNvSpPr>
+          <p:nvPr>
+            <p:ph type="title"/>
+          </p:nvPr>
+        </p:nvSpPr>
+        <p:spPr/>
+        <p:txBody>
+          <a:bodyPr>
+            <a:normAutofit/>
+          </a:bodyPr>
+          <a:lstStyle/>
+          <a:p>
+            <a:r>
+              <a:rPr lang="tr-TR" b="1" dirty="0">
+                <a:solidFill>
+                  <a:srgbClr val="292D33"/>
+                </a:solidFill>
+                <a:latin typeface="Euclid Circular B" panose="020B0504000000000000" pitchFamily="34" charset="0"/>
+                <a:ea typeface="Euclid Circular B" panose="020B0504000000000000" pitchFamily="34" charset="0"/>
+              </a:rPr>
+              <a:t>Kubernetes</a:t>
+            </a:r>
+            <a:r>
+              <a:rPr lang="en-US" b="1" dirty="0">
+                <a:solidFill>
+                  <a:srgbClr val="292D33"/>
+                </a:solidFill>
+                <a:latin typeface="Euclid Circular B" panose="020B0504000000000000" pitchFamily="34" charset="0"/>
+                <a:ea typeface="Euclid Circular B" panose="020B0504000000000000" pitchFamily="34" charset="0"/>
+              </a:rPr>
+              <a:t> </a:t>
+            </a:r>
+            <a:r>
+              <a:rPr lang="tr-TR" b="1" dirty="0">
+                <a:solidFill>
+                  <a:srgbClr val="292D33"/>
+                </a:solidFill>
+                <a:latin typeface="Euclid Circular B" panose="020B0504000000000000" pitchFamily="34" charset="0"/>
+                <a:ea typeface="Euclid Circular B" panose="020B0504000000000000" pitchFamily="34" charset="0"/>
+              </a:rPr>
+              <a:t>Integrated Microservice Development with ABP Studio</a:t>
+            </a:r>
+            <a:endParaRPr lang="en-US" b="1" dirty="0">
+              <a:solidFill>
+                <a:srgbClr val="292D33"/>
+              </a:solidFill>
+              <a:latin typeface="Euclid Circular B" panose="020B0504000000000000" pitchFamily="34" charset="0"/>
+              <a:ea typeface="Euclid Circular B" panose="020B0504000000000000" pitchFamily="34" charset="0"/>
+            </a:endParaRPr>
+          </a:p>
+        </p:txBody>
+      </p:sp>
+      <p:pic>
+        <p:nvPicPr>
+          <p:cNvPr id="7" name="Picture 6">
+            <a:extLst>
+              <a:ext uri="{FF2B5EF4-FFF2-40B4-BE49-F238E27FC236}">
+                <a16:creationId xmlns:a16="http://schemas.microsoft.com/office/drawing/2014/main" id="{EECF7EA5-5589-05EB-2726-E4C863A3706D}"/>
+              </a:ext>
+            </a:extLst>
+          </p:cNvPr>
+          <p:cNvPicPr>
+            <a:picLocks noChangeAspect="1"/>
+          </p:cNvPicPr>
+          <p:nvPr/>
+        </p:nvPicPr>
+        <p:blipFill>
+          <a:blip r:embed="rId3"/>
+          <a:stretch>
+            <a:fillRect/>
+          </a:stretch>
+        </p:blipFill>
+        <p:spPr>
+          <a:xfrm>
+            <a:off x="758687" y="2473630"/>
+            <a:ext cx="7476241" cy="4217816"/>
+          </a:xfrm>
+          <a:prstGeom prst="rect">
+            <a:avLst/>
+          </a:prstGeom>
+        </p:spPr>
+      </p:pic>
+      <p:sp>
+        <p:nvSpPr>
+          <p:cNvPr id="9" name="TextBox 8">
+            <a:extLst>
+              <a:ext uri="{FF2B5EF4-FFF2-40B4-BE49-F238E27FC236}">
+                <a16:creationId xmlns:a16="http://schemas.microsoft.com/office/drawing/2014/main" id="{8E544AB0-714F-CE2B-D4F9-8938C6873AB2}"/>
+              </a:ext>
+            </a:extLst>
+          </p:cNvPr>
+          <p:cNvSpPr txBox="1"/>
+          <p:nvPr/>
+        </p:nvSpPr>
+        <p:spPr>
+          <a:xfrm>
+            <a:off x="758687" y="1789771"/>
+            <a:ext cx="6094674" cy="584775"/>
+          </a:xfrm>
+          <a:prstGeom prst="rect">
+            <a:avLst/>
+          </a:prstGeom>
+          <a:noFill/>
+        </p:spPr>
+        <p:txBody>
+          <a:bodyPr wrap="square">
+            <a:spAutoFit/>
+          </a:bodyPr>
+          <a:lstStyle/>
+          <a:p>
+            <a:r>
+              <a:rPr lang="tr-TR" sz="3200" i="1" u="sng" dirty="0">
+                <a:solidFill>
+                  <a:schemeClr val="accent1">
+                    <a:lumMod val="40000"/>
+                    <a:lumOff val="60000"/>
+                  </a:schemeClr>
+                </a:solidFill>
+              </a:rPr>
+              <a:t>https://</a:t>
+            </a:r>
+            <a:r>
+              <a:rPr lang="en-US" sz="3200" i="1" u="sng" dirty="0">
+                <a:solidFill>
+                  <a:schemeClr val="accent1"/>
+                </a:solidFill>
+              </a:rPr>
+              <a:t>abp.io/</a:t>
+            </a:r>
+            <a:r>
+              <a:rPr lang="en-US" sz="3200" b="1" i="1" u="sng" dirty="0">
+                <a:solidFill>
+                  <a:schemeClr val="accent1"/>
+                </a:solidFill>
+              </a:rPr>
+              <a:t>talks/</a:t>
+            </a:r>
+            <a:r>
+              <a:rPr lang="en-US" sz="3200" b="1" i="1" u="sng" dirty="0" err="1">
+                <a:solidFill>
+                  <a:schemeClr val="accent1"/>
+                </a:solidFill>
+              </a:rPr>
+              <a:t>kube</a:t>
+            </a:r>
+            <a:r>
+              <a:rPr lang="en-US" sz="3200" b="1" i="1" u="sng" dirty="0">
+                <a:solidFill>
+                  <a:schemeClr val="accent1"/>
+                </a:solidFill>
+              </a:rPr>
+              <a:t>-dev</a:t>
+            </a:r>
+            <a:r>
+              <a:rPr lang="tr-TR" sz="3200" b="1" i="1" u="sng" dirty="0">
+                <a:solidFill>
+                  <a:schemeClr val="accent1"/>
+                </a:solidFill>
+              </a:rPr>
+              <a:t> </a:t>
+            </a:r>
+            <a:endParaRPr lang="en-US" sz="3200" b="1" i="1" u="sng" dirty="0">
+              <a:solidFill>
+                <a:schemeClr val="accent1"/>
+              </a:solidFill>
+            </a:endParaRPr>
+          </a:p>
+        </p:txBody>
+      </p:sp>
+    </p:spTree>
+    <p:extLst>
+      <p:ext uri="{BB962C8B-B14F-4D97-AF65-F5344CB8AC3E}">
+        <p14:creationId xmlns:p14="http://schemas.microsoft.com/office/powerpoint/2010/main" val="781682869"/>
+      </p:ext>
+    </p:extLst>
+  </p:cSld>
+  <p:clrMapOvr>
+    <a:masterClrMapping/>
+  </p:clrMapOvr>
+</p:sld>
+</file>
+
+<file path=ppt/slides/slide13.xml><?xml version="1.0" encoding="utf-8"?>
+<p:sld xmlns:a="http://schemas.openxmlformats.org/drawingml/2006/main" xmlns:r="http://schemas.openxmlformats.org/officeDocument/2006/relationships" xmlns:p="http://schemas.openxmlformats.org/presentationml/2006/main">
+  <p:cSld>
+    <p:bg>
+      <p:bgPr>
+        <a:blipFill dpi="0" rotWithShape="1">
+          <a:blip r:embed="rId2">
+            <a:lum/>
+          </a:blip>
+          <a:srcRect/>
+          <a:stretch>
+            <a:fillRect/>
+          </a:stretch>
+        </a:blipFill>
+        <a:effectLst/>
+      </p:bgPr>
+    </p:bg>
+    <p:spTree>
+      <p:nvGrpSpPr>
+        <p:cNvPr id="1" name=""/>
+        <p:cNvGrpSpPr/>
+        <p:nvPr/>
+      </p:nvGrpSpPr>
+      <p:grpSpPr>
+        <a:xfrm>
+          <a:off x="0" y="0"/>
+          <a:ext cx="0" cy="0"/>
+          <a:chOff x="0" y="0"/>
+          <a:chExt cx="0" cy="0"/>
+        </a:xfrm>
+      </p:grpSpPr>
+      <p:sp>
+        <p:nvSpPr>
+          <p:cNvPr id="2" name="Title 1">
+            <a:extLst>
+              <a:ext uri="{FF2B5EF4-FFF2-40B4-BE49-F238E27FC236}">
+                <a16:creationId xmlns:a16="http://schemas.microsoft.com/office/drawing/2014/main" id="{55E11F08-6CA0-48F1-AD67-97430DDA07F0}"/>
+              </a:ext>
+            </a:extLst>
+          </p:cNvPr>
+          <p:cNvSpPr>
+            <a:spLocks noGrp="1"/>
+          </p:cNvSpPr>
+          <p:nvPr>
+            <p:ph type="title"/>
+          </p:nvPr>
+        </p:nvSpPr>
+        <p:spPr/>
+        <p:txBody>
+          <a:bodyPr/>
+          <a:lstStyle/>
+          <a:p>
+            <a:r>
+              <a:rPr lang="tr-TR" b="1" dirty="0">
+                <a:solidFill>
+                  <a:srgbClr val="292D33"/>
+                </a:solidFill>
+                <a:latin typeface="Euclid Circular B" panose="020B0504000000000000" pitchFamily="34" charset="0"/>
+                <a:ea typeface="Euclid Circular B" panose="020B0504000000000000" pitchFamily="34" charset="0"/>
+              </a:rPr>
+              <a:t>LeptonX: The New Login Page (Light)</a:t>
+            </a:r>
+            <a:endParaRPr lang="en-US" b="1" dirty="0">
+              <a:solidFill>
+                <a:srgbClr val="292D33"/>
+              </a:solidFill>
+              <a:latin typeface="Euclid Circular B" panose="020B0504000000000000" pitchFamily="34" charset="0"/>
+              <a:ea typeface="Euclid Circular B" panose="020B0504000000000000" pitchFamily="34" charset="0"/>
+            </a:endParaRPr>
+          </a:p>
+        </p:txBody>
+      </p:sp>
+      <p:pic>
+        <p:nvPicPr>
+          <p:cNvPr id="1026" name="Picture 2">
+            <a:extLst>
+              <a:ext uri="{FF2B5EF4-FFF2-40B4-BE49-F238E27FC236}">
+                <a16:creationId xmlns:a16="http://schemas.microsoft.com/office/drawing/2014/main" id="{912B2C31-361A-A737-3270-6E39C6977120}"/>
+              </a:ext>
+            </a:extLst>
+          </p:cNvPr>
+          <p:cNvPicPr>
+            <a:picLocks noChangeAspect="1" noChangeArrowheads="1"/>
+          </p:cNvPicPr>
+          <p:nvPr/>
+        </p:nvPicPr>
+        <p:blipFill>
+          <a:blip r:embed="rId3">
+            <a:extLst>
+              <a:ext uri="{28A0092B-C50C-407E-A947-70E740481C1C}">
+                <a14:useLocalDpi xmlns:a14="http://schemas.microsoft.com/office/drawing/2010/main" val="0"/>
+              </a:ext>
+            </a:extLst>
+          </a:blip>
+          <a:srcRect/>
+          <a:stretch>
+            <a:fillRect/>
+          </a:stretch>
+        </p:blipFill>
+        <p:spPr bwMode="auto">
+          <a:xfrm>
+            <a:off x="2493770" y="1689903"/>
+            <a:ext cx="7204459" cy="4802972"/>
+          </a:xfrm>
+          <a:prstGeom prst="rect">
+            <a:avLst/>
+          </a:prstGeom>
+          <a:noFill/>
+          <a:effectLst>
+            <a:outerShdw blurRad="63500" sx="102000" sy="102000" algn="ctr" rotWithShape="0">
+              <a:prstClr val="black">
+                <a:alpha val="40000"/>
+              </a:prstClr>
+            </a:outerShdw>
+          </a:effectLst>
+          <a:extLst>
+            <a:ext uri="{909E8E84-426E-40DD-AFC4-6F175D3DCCD1}">
+              <a14:hiddenFill xmlns:a14="http://schemas.microsoft.com/office/drawing/2010/main">
+                <a:solidFill>
+                  <a:srgbClr val="FFFFFF"/>
+                </a:solidFill>
+              </a14:hiddenFill>
+            </a:ext>
+          </a:extLst>
+        </p:spPr>
+      </p:pic>
+    </p:spTree>
+    <p:extLst>
+      <p:ext uri="{BB962C8B-B14F-4D97-AF65-F5344CB8AC3E}">
+        <p14:creationId xmlns:p14="http://schemas.microsoft.com/office/powerpoint/2010/main" val="1961488630"/>
+      </p:ext>
+    </p:extLst>
+  </p:cSld>
+  <p:clrMapOvr>
+    <a:masterClrMapping/>
+  </p:clrMapOvr>
+</p:sld>
+</file>
+
+<file path=ppt/slides/slide14.xml><?xml version="1.0" encoding="utf-8"?>
+<p:sld xmlns:a="http://schemas.openxmlformats.org/drawingml/2006/main" xmlns:r="http://schemas.openxmlformats.org/officeDocument/2006/relationships" xmlns:p="http://schemas.openxmlformats.org/presentationml/2006/main">
+  <p:cSld>
+    <p:bg>
+      <p:bgPr>
+        <a:blipFill dpi="0" rotWithShape="1">
+          <a:blip r:embed="rId2">
+            <a:lum/>
+          </a:blip>
+          <a:srcRect/>
+          <a:stretch>
+            <a:fillRect/>
+          </a:stretch>
+        </a:blipFill>
+        <a:effectLst/>
+      </p:bgPr>
+    </p:bg>
+    <p:spTree>
+      <p:nvGrpSpPr>
+        <p:cNvPr id="1" name=""/>
+        <p:cNvGrpSpPr/>
+        <p:nvPr/>
+      </p:nvGrpSpPr>
+      <p:grpSpPr>
+        <a:xfrm>
+          <a:off x="0" y="0"/>
+          <a:ext cx="0" cy="0"/>
+          <a:chOff x="0" y="0"/>
+          <a:chExt cx="0" cy="0"/>
+        </a:xfrm>
+      </p:grpSpPr>
+      <p:sp>
+        <p:nvSpPr>
+          <p:cNvPr id="2" name="Title 1">
+            <a:extLst>
+              <a:ext uri="{FF2B5EF4-FFF2-40B4-BE49-F238E27FC236}">
+                <a16:creationId xmlns:a16="http://schemas.microsoft.com/office/drawing/2014/main" id="{55E11F08-6CA0-48F1-AD67-97430DDA07F0}"/>
+              </a:ext>
+            </a:extLst>
+          </p:cNvPr>
+          <p:cNvSpPr>
+            <a:spLocks noGrp="1"/>
+          </p:cNvSpPr>
+          <p:nvPr>
+            <p:ph type="title"/>
+          </p:nvPr>
+        </p:nvSpPr>
+        <p:spPr/>
+        <p:txBody>
+          <a:bodyPr/>
+          <a:lstStyle/>
+          <a:p>
+            <a:r>
+              <a:rPr lang="tr-TR" b="1" dirty="0">
+                <a:solidFill>
+                  <a:srgbClr val="292D33"/>
+                </a:solidFill>
+                <a:latin typeface="Euclid Circular B" panose="020B0504000000000000" pitchFamily="34" charset="0"/>
+                <a:ea typeface="Euclid Circular B" panose="020B0504000000000000" pitchFamily="34" charset="0"/>
+              </a:rPr>
+              <a:t>LeptonX: The New Login Page (Dark)</a:t>
+            </a:r>
+            <a:endParaRPr lang="en-US" b="1" dirty="0">
+              <a:solidFill>
+                <a:srgbClr val="292D33"/>
+              </a:solidFill>
+              <a:latin typeface="Euclid Circular B" panose="020B0504000000000000" pitchFamily="34" charset="0"/>
+              <a:ea typeface="Euclid Circular B" panose="020B0504000000000000" pitchFamily="34" charset="0"/>
+            </a:endParaRPr>
+          </a:p>
+        </p:txBody>
+      </p:sp>
+      <p:pic>
+        <p:nvPicPr>
+          <p:cNvPr id="2050" name="Picture 2">
+            <a:extLst>
+              <a:ext uri="{FF2B5EF4-FFF2-40B4-BE49-F238E27FC236}">
+                <a16:creationId xmlns:a16="http://schemas.microsoft.com/office/drawing/2014/main" id="{CEB60DD1-34DE-5D64-F11A-7A4390917A2E}"/>
+              </a:ext>
+            </a:extLst>
+          </p:cNvPr>
+          <p:cNvPicPr>
+            <a:picLocks noChangeAspect="1" noChangeArrowheads="1"/>
+          </p:cNvPicPr>
+          <p:nvPr/>
+        </p:nvPicPr>
+        <p:blipFill>
+          <a:blip r:embed="rId3">
+            <a:extLst>
+              <a:ext uri="{28A0092B-C50C-407E-A947-70E740481C1C}">
+                <a14:useLocalDpi xmlns:a14="http://schemas.microsoft.com/office/drawing/2010/main" val="0"/>
+              </a:ext>
+            </a:extLst>
+          </a:blip>
+          <a:srcRect/>
+          <a:stretch>
+            <a:fillRect/>
+          </a:stretch>
+        </p:blipFill>
+        <p:spPr bwMode="auto">
+          <a:xfrm>
+            <a:off x="2494359" y="1690688"/>
+            <a:ext cx="7203281" cy="4802187"/>
+          </a:xfrm>
+          <a:prstGeom prst="rect">
+            <a:avLst/>
+          </a:prstGeom>
+          <a:noFill/>
+          <a:effectLst>
+            <a:outerShdw blurRad="63500" sx="102000" sy="102000" algn="ctr" rotWithShape="0">
+              <a:prstClr val="black">
+                <a:alpha val="40000"/>
+              </a:prstClr>
+            </a:outerShdw>
+          </a:effectLst>
+          <a:extLst>
+            <a:ext uri="{909E8E84-426E-40DD-AFC4-6F175D3DCCD1}">
+              <a14:hiddenFill xmlns:a14="http://schemas.microsoft.com/office/drawing/2010/main">
+                <a:solidFill>
+                  <a:srgbClr val="FFFFFF"/>
+                </a:solidFill>
+              </a14:hiddenFill>
+            </a:ext>
+          </a:extLst>
+        </p:spPr>
+      </p:pic>
+    </p:spTree>
+    <p:extLst>
+      <p:ext uri="{BB962C8B-B14F-4D97-AF65-F5344CB8AC3E}">
+        <p14:creationId xmlns:p14="http://schemas.microsoft.com/office/powerpoint/2010/main" val="952298655"/>
+      </p:ext>
+    </p:extLst>
+  </p:cSld>
+  <p:clrMapOvr>
+    <a:masterClrMapping/>
+  </p:clrMapOvr>
+</p:sld>
+</file>
+
+<file path=ppt/slides/slide15.xml><?xml version="1.0" encoding="utf-8"?>
+<p:sld xmlns:a="http://schemas.openxmlformats.org/drawingml/2006/main" xmlns:r="http://schemas.openxmlformats.org/officeDocument/2006/relationships" xmlns:p="http://schemas.openxmlformats.org/presentationml/2006/main">
+  <p:cSld>
+    <p:bg>
+      <p:bgPr>
+        <a:blipFill dpi="0" rotWithShape="1">
+          <a:blip r:embed="rId2">
+            <a:lum/>
+          </a:blip>
+          <a:srcRect/>
+          <a:stretch>
+            <a:fillRect/>
+          </a:stretch>
+        </a:blipFill>
+        <a:effectLst/>
+      </p:bgPr>
+    </p:bg>
+    <p:spTree>
+      <p:nvGrpSpPr>
+        <p:cNvPr id="1" name=""/>
+        <p:cNvGrpSpPr/>
+        <p:nvPr/>
+      </p:nvGrpSpPr>
+      <p:grpSpPr>
+        <a:xfrm>
+          <a:off x="0" y="0"/>
+          <a:ext cx="0" cy="0"/>
+          <a:chOff x="0" y="0"/>
+          <a:chExt cx="0" cy="0"/>
+        </a:xfrm>
+      </p:grpSpPr>
+      <p:sp>
+        <p:nvSpPr>
+          <p:cNvPr id="2" name="Title 1">
+            <a:extLst>
+              <a:ext uri="{FF2B5EF4-FFF2-40B4-BE49-F238E27FC236}">
+                <a16:creationId xmlns:a16="http://schemas.microsoft.com/office/drawing/2014/main" id="{55E11F08-6CA0-48F1-AD67-97430DDA07F0}"/>
+              </a:ext>
+            </a:extLst>
+          </p:cNvPr>
+          <p:cNvSpPr>
+            <a:spLocks noGrp="1"/>
+          </p:cNvSpPr>
+          <p:nvPr>
+            <p:ph type="title"/>
+          </p:nvPr>
+        </p:nvSpPr>
+        <p:spPr/>
+        <p:txBody>
+          <a:bodyPr/>
+          <a:lstStyle/>
+          <a:p>
+            <a:r>
+              <a:rPr lang="tr-TR" b="1" dirty="0">
+                <a:solidFill>
+                  <a:srgbClr val="292D33"/>
+                </a:solidFill>
+                <a:latin typeface="Euclid Circular B" panose="020B0504000000000000" pitchFamily="34" charset="0"/>
+                <a:ea typeface="Euclid Circular B" panose="020B0504000000000000" pitchFamily="34" charset="0"/>
+              </a:rPr>
+              <a:t>LeptonX: The New Login Page (Alternative)</a:t>
+            </a:r>
+            <a:endParaRPr lang="en-US" b="1" dirty="0">
+              <a:solidFill>
+                <a:srgbClr val="292D33"/>
+              </a:solidFill>
+              <a:latin typeface="Euclid Circular B" panose="020B0504000000000000" pitchFamily="34" charset="0"/>
+              <a:ea typeface="Euclid Circular B" panose="020B0504000000000000" pitchFamily="34" charset="0"/>
+            </a:endParaRPr>
+          </a:p>
+        </p:txBody>
+      </p:sp>
+      <p:pic>
+        <p:nvPicPr>
+          <p:cNvPr id="3074" name="Picture 2">
+            <a:extLst>
+              <a:ext uri="{FF2B5EF4-FFF2-40B4-BE49-F238E27FC236}">
+                <a16:creationId xmlns:a16="http://schemas.microsoft.com/office/drawing/2014/main" id="{DF1DC1A0-D402-5860-9102-47CD76362412}"/>
+              </a:ext>
+            </a:extLst>
+          </p:cNvPr>
+          <p:cNvPicPr>
+            <a:picLocks noChangeAspect="1" noChangeArrowheads="1"/>
+          </p:cNvPicPr>
+          <p:nvPr/>
+        </p:nvPicPr>
+        <p:blipFill>
+          <a:blip r:embed="rId3">
+            <a:extLst>
+              <a:ext uri="{28A0092B-C50C-407E-A947-70E740481C1C}">
+                <a14:useLocalDpi xmlns:a14="http://schemas.microsoft.com/office/drawing/2010/main" val="0"/>
+              </a:ext>
+            </a:extLst>
+          </a:blip>
+          <a:srcRect/>
+          <a:stretch>
+            <a:fillRect/>
+          </a:stretch>
+        </p:blipFill>
+        <p:spPr bwMode="auto">
+          <a:xfrm>
+            <a:off x="2494360" y="1690688"/>
+            <a:ext cx="7203280" cy="4802187"/>
+          </a:xfrm>
+          <a:prstGeom prst="rect">
+            <a:avLst/>
+          </a:prstGeom>
+          <a:noFill/>
+          <a:effectLst>
+            <a:outerShdw blurRad="63500" sx="102000" sy="102000" algn="ctr" rotWithShape="0">
+              <a:prstClr val="black">
+                <a:alpha val="40000"/>
+              </a:prstClr>
+            </a:outerShdw>
+          </a:effectLst>
+          <a:extLst>
+            <a:ext uri="{909E8E84-426E-40DD-AFC4-6F175D3DCCD1}">
+              <a14:hiddenFill xmlns:a14="http://schemas.microsoft.com/office/drawing/2010/main">
+                <a:solidFill>
+                  <a:srgbClr val="FFFFFF"/>
+                </a:solidFill>
+              </a14:hiddenFill>
+            </a:ext>
+          </a:extLst>
+        </p:spPr>
+      </p:pic>
+    </p:spTree>
+    <p:extLst>
+      <p:ext uri="{BB962C8B-B14F-4D97-AF65-F5344CB8AC3E}">
+        <p14:creationId xmlns:p14="http://schemas.microsoft.com/office/powerpoint/2010/main" val="1877271063"/>
+      </p:ext>
+    </p:extLst>
+  </p:cSld>
+  <p:clrMapOvr>
+    <a:masterClrMapping/>
+  </p:clrMapOvr>
+</p:sld>
+</file>
+
 <file path=ppt/slides/slide2.xml><?xml version="1.0" encoding="utf-8"?>
 <p:sld xmlns:a="http://schemas.openxmlformats.org/drawingml/2006/main" xmlns:r="http://schemas.openxmlformats.org/officeDocument/2006/relationships" xmlns:p="http://schemas.openxmlformats.org/presentationml/2006/main">
   <p:cSld>
@@ -3493,70 +4995,109 @@
           <p:cNvPr id="2" name="Title 1">
             <a:extLst>
               <a:ext uri="{FF2B5EF4-FFF2-40B4-BE49-F238E27FC236}">
-                <a16:creationId xmlns:a16="http://schemas.microsoft.com/office/drawing/2014/main" id="{55E11F08-6CA0-48F1-AD67-97430DDA07F0}"/>
-              </a:ext>
-            </a:extLst>
-          </p:cNvPr>
-          <p:cNvSpPr>
-            <a:spLocks noGrp="1"/>
-          </p:cNvSpPr>
-          <p:nvPr>
-            <p:ph type="title"/>
+                <a16:creationId xmlns:a16="http://schemas.microsoft.com/office/drawing/2014/main" id="{9255DFBE-19DA-408D-84E6-F4043FC30BD3}"/>
+              </a:ext>
+            </a:extLst>
+          </p:cNvPr>
+          <p:cNvSpPr>
+            <a:spLocks noGrp="1"/>
+          </p:cNvSpPr>
+          <p:nvPr>
+            <p:ph type="ctrTitle"/>
           </p:nvPr>
         </p:nvSpPr>
         <p:spPr/>
         <p:txBody>
-          <a:bodyPr/>
-          <a:lstStyle/>
-          <a:p>
-            <a:r>
-              <a:rPr lang="en-US" b="1" dirty="0">
+          <a:bodyPr>
+            <a:normAutofit/>
+          </a:bodyPr>
+          <a:lstStyle/>
+          <a:p>
+            <a:r>
+              <a:rPr lang="tr-TR" sz="4000" b="1" dirty="0">
                 <a:solidFill>
                   <a:srgbClr val="292D33"/>
                 </a:solidFill>
                 <a:latin typeface="Euclid Circular B" panose="020B0504000000000000" pitchFamily="34" charset="0"/>
                 <a:ea typeface="Euclid Circular B" panose="020B0504000000000000" pitchFamily="34" charset="0"/>
               </a:rPr>
-              <a:t>Topic title</a:t>
-            </a:r>
-          </a:p>
-        </p:txBody>
-      </p:sp>
-      <p:sp>
-        <p:nvSpPr>
-          <p:cNvPr id="3" name="Content Placeholder 2">
-            <a:extLst>
-              <a:ext uri="{FF2B5EF4-FFF2-40B4-BE49-F238E27FC236}">
-                <a16:creationId xmlns:a16="http://schemas.microsoft.com/office/drawing/2014/main" id="{891C7693-D3DF-4635-96F4-97F3B4136FDF}"/>
-              </a:ext>
-            </a:extLst>
-          </p:cNvPr>
-          <p:cNvSpPr>
-            <a:spLocks noGrp="1"/>
-          </p:cNvSpPr>
-          <p:nvPr>
-            <p:ph idx="1"/>
-          </p:nvPr>
-        </p:nvSpPr>
-        <p:spPr/>
-        <p:txBody>
-          <a:bodyPr/>
-          <a:lstStyle/>
-          <a:p>
-            <a:r>
-              <a:rPr lang="en-US" dirty="0">
+              <a:t>What are coming with </a:t>
+            </a:r>
+            <a:r>
+              <a:rPr lang="tr-TR" sz="4000" b="1" dirty="0">
+                <a:solidFill>
+                  <a:srgbClr val="C00000"/>
+                </a:solidFill>
                 <a:latin typeface="Euclid Circular B" panose="020B0504000000000000" pitchFamily="34" charset="0"/>
                 <a:ea typeface="Euclid Circular B" panose="020B0504000000000000" pitchFamily="34" charset="0"/>
               </a:rPr>
-              <a:t>Content</a:t>
-            </a:r>
+              <a:t>ABP v7.3</a:t>
+            </a:r>
+            <a:endParaRPr lang="en-US" sz="4000" b="1" dirty="0">
+              <a:solidFill>
+                <a:srgbClr val="C00000"/>
+              </a:solidFill>
+              <a:latin typeface="Euclid Circular B" panose="020B0504000000000000" pitchFamily="34" charset="0"/>
+              <a:ea typeface="Euclid Circular B" panose="020B0504000000000000" pitchFamily="34" charset="0"/>
+            </a:endParaRPr>
+          </a:p>
+        </p:txBody>
+      </p:sp>
+      <p:sp>
+        <p:nvSpPr>
+          <p:cNvPr id="3" name="Subtitle 2">
+            <a:extLst>
+              <a:ext uri="{FF2B5EF4-FFF2-40B4-BE49-F238E27FC236}">
+                <a16:creationId xmlns:a16="http://schemas.microsoft.com/office/drawing/2014/main" id="{265612B9-B745-46CB-8A20-997CA82E05E7}"/>
+              </a:ext>
+            </a:extLst>
+          </p:cNvPr>
+          <p:cNvSpPr>
+            <a:spLocks noGrp="1"/>
+          </p:cNvSpPr>
+          <p:nvPr>
+            <p:ph type="subTitle" idx="1"/>
+          </p:nvPr>
+        </p:nvSpPr>
+        <p:spPr/>
+        <p:txBody>
+          <a:bodyPr>
+            <a:normAutofit/>
+          </a:bodyPr>
+          <a:lstStyle/>
+          <a:p>
+            <a:r>
+              <a:rPr lang="tr-TR" sz="2800" dirty="0">
+                <a:latin typeface="Euclid Circular B" panose="020B0504000000000000" pitchFamily="34" charset="0"/>
+                <a:ea typeface="Euclid Circular B" panose="020B0504000000000000" pitchFamily="34" charset="0"/>
+              </a:rPr>
+              <a:t>Planned Release Date: </a:t>
+            </a:r>
+            <a:r>
+              <a:rPr lang="tr-TR" sz="2800" b="1" dirty="0">
+                <a:latin typeface="Euclid Circular B" panose="020B0504000000000000" pitchFamily="34" charset="0"/>
+                <a:ea typeface="Euclid Circular B" panose="020B0504000000000000" pitchFamily="34" charset="0"/>
+              </a:rPr>
+              <a:t>June 06</a:t>
+            </a:r>
+            <a:r>
+              <a:rPr lang="tr-TR" sz="2800" dirty="0">
+                <a:latin typeface="Euclid Circular B" panose="020B0504000000000000" pitchFamily="34" charset="0"/>
+                <a:ea typeface="Euclid Circular B" panose="020B0504000000000000" pitchFamily="34" charset="0"/>
+              </a:rPr>
+              <a:t>, 2023</a:t>
+            </a:r>
+            <a:endParaRPr lang="en-US" sz="2800" dirty="0">
+              <a:latin typeface="Euclid Circular B" panose="020B0504000000000000" pitchFamily="34" charset="0"/>
+              <a:ea typeface="Euclid Circular B" panose="020B0504000000000000" pitchFamily="34" charset="0"/>
+            </a:endParaRPr>
           </a:p>
         </p:txBody>
       </p:sp>
     </p:spTree>
     <p:extLst>
       <p:ext uri="{BB962C8B-B14F-4D97-AF65-F5344CB8AC3E}">
-        <p14:creationId xmlns:p14="http://schemas.microsoft.com/office/powerpoint/2010/main" val="721846992"/>
+        <p14:creationId xmlns:p14="http://schemas.microsoft.com/office/powerpoint/2010/main" val="189839455"/>
       </p:ext>
     </p:extLst>
   </p:cSld>
@@ -3619,15 +5160,22 @@
           <a:lstStyle/>
           <a:p>
             <a:r>
-              <a:rPr lang="en-US" b="1" dirty="0">
+              <a:rPr lang="tr-TR" b="1" dirty="0">
                 <a:solidFill>
                   <a:srgbClr val="292D33"/>
                 </a:solidFill>
                 <a:latin typeface="Euclid Circular B" panose="020B0504000000000000" pitchFamily="34" charset="0"/>
                 <a:ea typeface="Euclid Circular B" panose="020B0504000000000000" pitchFamily="34" charset="0"/>
               </a:rPr>
-              <a:t>Topic title</a:t>
-            </a:r>
+              <a:t>ABP Framework: Imaging </a:t>
+            </a:r>
+            <a:endParaRPr lang="en-US" b="1" dirty="0">
+              <a:solidFill>
+                <a:srgbClr val="292D33"/>
+              </a:solidFill>
+              <a:latin typeface="Euclid Circular B" panose="020B0504000000000000" pitchFamily="34" charset="0"/>
+              <a:ea typeface="Euclid Circular B" panose="020B0504000000000000" pitchFamily="34" charset="0"/>
+            </a:endParaRPr>
           </a:p>
         </p:txBody>
       </p:sp>
@@ -3647,31 +5195,357 @@
             <p:ph idx="1"/>
           </p:nvPr>
         </p:nvSpPr>
-        <p:spPr/>
+        <p:spPr>
+          <a:xfrm>
+            <a:off x="838200" y="1825625"/>
+            <a:ext cx="5491038" cy="4351338"/>
+          </a:xfrm>
+        </p:spPr>
         <p:txBody>
           <a:bodyPr/>
           <a:lstStyle/>
           <a:p>
             <a:r>
-              <a:rPr lang="en-US" dirty="0">
+              <a:rPr lang="tr-TR" dirty="0">
                 <a:latin typeface="Euclid Circular B" panose="020B0504000000000000" pitchFamily="34" charset="0"/>
                 <a:ea typeface="Euclid Circular B" panose="020B0504000000000000" pitchFamily="34" charset="0"/>
               </a:rPr>
-              <a:t>Content</a:t>
-            </a:r>
-          </a:p>
-        </p:txBody>
-      </p:sp>
+              <a:t>Services for </a:t>
+            </a:r>
+            <a:r>
+              <a:rPr lang="tr-TR" b="1" dirty="0">
+                <a:latin typeface="Euclid Circular B" panose="020B0504000000000000" pitchFamily="34" charset="0"/>
+                <a:ea typeface="Euclid Circular B" panose="020B0504000000000000" pitchFamily="34" charset="0"/>
+              </a:rPr>
+              <a:t>resizing </a:t>
+            </a:r>
+            <a:r>
+              <a:rPr lang="tr-TR" dirty="0">
+                <a:latin typeface="Euclid Circular B" panose="020B0504000000000000" pitchFamily="34" charset="0"/>
+                <a:ea typeface="Euclid Circular B" panose="020B0504000000000000" pitchFamily="34" charset="0"/>
+              </a:rPr>
+              <a:t>and </a:t>
+            </a:r>
+            <a:r>
+              <a:rPr lang="tr-TR" b="1" dirty="0">
+                <a:latin typeface="Euclid Circular B" panose="020B0504000000000000" pitchFamily="34" charset="0"/>
+                <a:ea typeface="Euclid Circular B" panose="020B0504000000000000" pitchFamily="34" charset="0"/>
+              </a:rPr>
+              <a:t>compressing </a:t>
+            </a:r>
+            <a:r>
+              <a:rPr lang="tr-TR" dirty="0">
+                <a:latin typeface="Euclid Circular B" panose="020B0504000000000000" pitchFamily="34" charset="0"/>
+                <a:ea typeface="Euclid Circular B" panose="020B0504000000000000" pitchFamily="34" charset="0"/>
+              </a:rPr>
+              <a:t>images</a:t>
+            </a:r>
+          </a:p>
+          <a:p>
+            <a:r>
+              <a:rPr lang="tr-TR" b="1" dirty="0">
+                <a:latin typeface="Euclid Circular B" panose="020B0504000000000000" pitchFamily="34" charset="0"/>
+                <a:ea typeface="Euclid Circular B" panose="020B0504000000000000" pitchFamily="34" charset="0"/>
+              </a:rPr>
+              <a:t>Imagesharp </a:t>
+            </a:r>
+            <a:r>
+              <a:rPr lang="tr-TR" dirty="0">
+                <a:latin typeface="Euclid Circular B" panose="020B0504000000000000" pitchFamily="34" charset="0"/>
+                <a:ea typeface="Euclid Circular B" panose="020B0504000000000000" pitchFamily="34" charset="0"/>
+              </a:rPr>
+              <a:t>and </a:t>
+            </a:r>
+            <a:r>
+              <a:rPr lang="tr-TR" b="1" dirty="0">
+                <a:latin typeface="Euclid Circular B" panose="020B0504000000000000" pitchFamily="34" charset="0"/>
+                <a:ea typeface="Euclid Circular B" panose="020B0504000000000000" pitchFamily="34" charset="0"/>
+              </a:rPr>
+              <a:t>MagickNet </a:t>
+            </a:r>
+            <a:r>
+              <a:rPr lang="tr-TR" dirty="0">
+                <a:latin typeface="Euclid Circular B" panose="020B0504000000000000" pitchFamily="34" charset="0"/>
+                <a:ea typeface="Euclid Circular B" panose="020B0504000000000000" pitchFamily="34" charset="0"/>
+              </a:rPr>
+              <a:t>providers</a:t>
+            </a:r>
+          </a:p>
+          <a:p>
+            <a:r>
+              <a:rPr lang="tr-TR" b="1" dirty="0">
+                <a:latin typeface="Euclid Circular B" panose="020B0504000000000000" pitchFamily="34" charset="0"/>
+                <a:ea typeface="Euclid Circular B" panose="020B0504000000000000" pitchFamily="34" charset="0"/>
+              </a:rPr>
+              <a:t>ASP.NET Core</a:t>
+            </a:r>
+            <a:r>
+              <a:rPr lang="tr-TR" dirty="0">
+                <a:latin typeface="Euclid Circular B" panose="020B0504000000000000" pitchFamily="34" charset="0"/>
+                <a:ea typeface="Euclid Circular B" panose="020B0504000000000000" pitchFamily="34" charset="0"/>
+              </a:rPr>
+              <a:t> action filter integration</a:t>
+            </a:r>
+            <a:endParaRPr lang="en-US" dirty="0">
+              <a:latin typeface="Euclid Circular B" panose="020B0504000000000000" pitchFamily="34" charset="0"/>
+              <a:ea typeface="Euclid Circular B" panose="020B0504000000000000" pitchFamily="34" charset="0"/>
+            </a:endParaRPr>
+          </a:p>
+        </p:txBody>
+      </p:sp>
+      <p:pic>
+        <p:nvPicPr>
+          <p:cNvPr id="5" name="Picture 4">
+            <a:extLst>
+              <a:ext uri="{FF2B5EF4-FFF2-40B4-BE49-F238E27FC236}">
+                <a16:creationId xmlns:a16="http://schemas.microsoft.com/office/drawing/2014/main" id="{09908977-854B-FFC3-8B7D-5B82F9CF4A28}"/>
+              </a:ext>
+            </a:extLst>
+          </p:cNvPr>
+          <p:cNvPicPr>
+            <a:picLocks noChangeAspect="1"/>
+          </p:cNvPicPr>
+          <p:nvPr/>
+        </p:nvPicPr>
+        <p:blipFill>
+          <a:blip r:embed="rId3"/>
+          <a:stretch>
+            <a:fillRect/>
+          </a:stretch>
+        </p:blipFill>
+        <p:spPr>
+          <a:xfrm>
+            <a:off x="6488650" y="1825625"/>
+            <a:ext cx="5254268" cy="2575622"/>
+          </a:xfrm>
+          <a:prstGeom prst="rect">
+            <a:avLst/>
+          </a:prstGeom>
+        </p:spPr>
+      </p:pic>
     </p:spTree>
     <p:extLst>
       <p:ext uri="{BB962C8B-B14F-4D97-AF65-F5344CB8AC3E}">
-        <p14:creationId xmlns:p14="http://schemas.microsoft.com/office/powerpoint/2010/main" val="795882860"/>
+        <p14:creationId xmlns:p14="http://schemas.microsoft.com/office/powerpoint/2010/main" val="721846992"/>
       </p:ext>
     </p:extLst>
   </p:cSld>
   <p:clrMapOvr>
     <a:masterClrMapping/>
   </p:clrMapOvr>
+  <p:timing>
+    <p:tnLst>
+      <p:par>
+        <p:cTn id="1" dur="indefinite" restart="never" nodeType="tmRoot">
+          <p:childTnLst>
+            <p:seq concurrent="1" nextAc="seek">
+              <p:cTn id="2" dur="indefinite" nodeType="mainSeq">
+                <p:childTnLst>
+                  <p:par>
+                    <p:cTn id="3" fill="hold">
+                      <p:stCondLst>
+                        <p:cond delay="indefinite"/>
+                      </p:stCondLst>
+                      <p:childTnLst>
+                        <p:par>
+                          <p:cTn id="4" fill="hold">
+                            <p:stCondLst>
+                              <p:cond delay="0"/>
+                            </p:stCondLst>
+                            <p:childTnLst>
+                              <p:par>
+                                <p:cTn id="5" presetID="10" presetClass="entr" presetSubtype="0" fill="hold" nodeType="clickEffect">
+                                  <p:stCondLst>
+                                    <p:cond delay="0"/>
+                                  </p:stCondLst>
+                                  <p:childTnLst>
+                                    <p:set>
+                                      <p:cBhvr>
+                                        <p:cTn id="6" dur="1" fill="hold">
+                                          <p:stCondLst>
+                                            <p:cond delay="0"/>
+                                          </p:stCondLst>
+                                        </p:cTn>
+                                        <p:tgtEl>
+                                          <p:spTgt spid="3">
+                                            <p:txEl>
+                                              <p:pRg st="0" end="0"/>
+                                            </p:txEl>
+                                          </p:spTgt>
+                                        </p:tgtEl>
+                                        <p:attrNameLst>
+                                          <p:attrName>style.visibility</p:attrName>
+                                        </p:attrNameLst>
+                                      </p:cBhvr>
+                                      <p:to>
+                                        <p:strVal val="visible"/>
+                                      </p:to>
+                                    </p:set>
+                                    <p:animEffect transition="in" filter="fade">
+                                      <p:cBhvr>
+                                        <p:cTn id="7" dur="500"/>
+                                        <p:tgtEl>
+                                          <p:spTgt spid="3">
+                                            <p:txEl>
+                                              <p:pRg st="0" end="0"/>
+                                            </p:txEl>
+                                          </p:spTgt>
+                                        </p:tgtEl>
+                                      </p:cBhvr>
+                                    </p:animEffect>
+                                  </p:childTnLst>
+                                </p:cTn>
+                              </p:par>
+                            </p:childTnLst>
+                          </p:cTn>
+                        </p:par>
+                      </p:childTnLst>
+                    </p:cTn>
+                  </p:par>
+                  <p:par>
+                    <p:cTn id="8" fill="hold">
+                      <p:stCondLst>
+                        <p:cond delay="indefinite"/>
+                      </p:stCondLst>
+                      <p:childTnLst>
+                        <p:par>
+                          <p:cTn id="9" fill="hold">
+                            <p:stCondLst>
+                              <p:cond delay="0"/>
+                            </p:stCondLst>
+                            <p:childTnLst>
+                              <p:par>
+                                <p:cTn id="10" presetID="10" presetClass="entr" presetSubtype="0" fill="hold" nodeType="clickEffect">
+                                  <p:stCondLst>
+                                    <p:cond delay="0"/>
+                                  </p:stCondLst>
+                                  <p:childTnLst>
+                                    <p:set>
+                                      <p:cBhvr>
+                                        <p:cTn id="11" dur="1" fill="hold">
+                                          <p:stCondLst>
+                                            <p:cond delay="0"/>
+                                          </p:stCondLst>
+                                        </p:cTn>
+                                        <p:tgtEl>
+                                          <p:spTgt spid="3">
+                                            <p:txEl>
+                                              <p:pRg st="1" end="1"/>
+                                            </p:txEl>
+                                          </p:spTgt>
+                                        </p:tgtEl>
+                                        <p:attrNameLst>
+                                          <p:attrName>style.visibility</p:attrName>
+                                        </p:attrNameLst>
+                                      </p:cBhvr>
+                                      <p:to>
+                                        <p:strVal val="visible"/>
+                                      </p:to>
+                                    </p:set>
+                                    <p:animEffect transition="in" filter="fade">
+                                      <p:cBhvr>
+                                        <p:cTn id="12" dur="500"/>
+                                        <p:tgtEl>
+                                          <p:spTgt spid="3">
+                                            <p:txEl>
+                                              <p:pRg st="1" end="1"/>
+                                            </p:txEl>
+                                          </p:spTgt>
+                                        </p:tgtEl>
+                                      </p:cBhvr>
+                                    </p:animEffect>
+                                  </p:childTnLst>
+                                </p:cTn>
+                              </p:par>
+                            </p:childTnLst>
+                          </p:cTn>
+                        </p:par>
+                      </p:childTnLst>
+                    </p:cTn>
+                  </p:par>
+                  <p:par>
+                    <p:cTn id="13" fill="hold">
+                      <p:stCondLst>
+                        <p:cond delay="indefinite"/>
+                      </p:stCondLst>
+                      <p:childTnLst>
+                        <p:par>
+                          <p:cTn id="14" fill="hold">
+                            <p:stCondLst>
+                              <p:cond delay="0"/>
+                            </p:stCondLst>
+                            <p:childTnLst>
+                              <p:par>
+                                <p:cTn id="15" presetID="10" presetClass="entr" presetSubtype="0" fill="hold" nodeType="clickEffect">
+                                  <p:stCondLst>
+                                    <p:cond delay="0"/>
+                                  </p:stCondLst>
+                                  <p:childTnLst>
+                                    <p:set>
+                                      <p:cBhvr>
+                                        <p:cTn id="16" dur="1" fill="hold">
+                                          <p:stCondLst>
+                                            <p:cond delay="0"/>
+                                          </p:stCondLst>
+                                        </p:cTn>
+                                        <p:tgtEl>
+                                          <p:spTgt spid="3">
+                                            <p:txEl>
+                                              <p:pRg st="2" end="2"/>
+                                            </p:txEl>
+                                          </p:spTgt>
+                                        </p:tgtEl>
+                                        <p:attrNameLst>
+                                          <p:attrName>style.visibility</p:attrName>
+                                        </p:attrNameLst>
+                                      </p:cBhvr>
+                                      <p:to>
+                                        <p:strVal val="visible"/>
+                                      </p:to>
+                                    </p:set>
+                                    <p:animEffect transition="in" filter="fade">
+                                      <p:cBhvr>
+                                        <p:cTn id="17" dur="500"/>
+                                        <p:tgtEl>
+                                          <p:spTgt spid="3">
+                                            <p:txEl>
+                                              <p:pRg st="2" end="2"/>
+                                            </p:txEl>
+                                          </p:spTgt>
+                                        </p:tgtEl>
+                                      </p:cBhvr>
+                                    </p:animEffect>
+                                  </p:childTnLst>
+                                </p:cTn>
+                              </p:par>
+                            </p:childTnLst>
+                          </p:cTn>
+                        </p:par>
+                      </p:childTnLst>
+                    </p:cTn>
+                  </p:par>
+                </p:childTnLst>
+              </p:cTn>
+              <p:prevCondLst>
+                <p:cond evt="onPrev" delay="0">
+                  <p:tgtEl>
+                    <p:sldTgt/>
+                  </p:tgtEl>
+                </p:cond>
+              </p:prevCondLst>
+              <p:nextCondLst>
+                <p:cond evt="onNext" delay="0">
+                  <p:tgtEl>
+                    <p:sldTgt/>
+                  </p:tgtEl>
+                </p:cond>
+              </p:nextCondLst>
+            </p:seq>
+          </p:childTnLst>
+        </p:cTn>
+      </p:par>
+    </p:tnLst>
+  </p:timing>
 </p:sld>
 </file>
 
@@ -3728,59 +5602,231 @@
           <a:lstStyle/>
           <a:p>
             <a:r>
-              <a:rPr lang="en-US" b="1" dirty="0">
+              <a:rPr lang="tr-TR" b="1" dirty="0">
                 <a:solidFill>
                   <a:srgbClr val="292D33"/>
                 </a:solidFill>
                 <a:latin typeface="Euclid Circular B" panose="020B0504000000000000" pitchFamily="34" charset="0"/>
                 <a:ea typeface="Euclid Circular B" panose="020B0504000000000000" pitchFamily="34" charset="0"/>
               </a:rPr>
-              <a:t>Topic title</a:t>
-            </a:r>
-          </a:p>
-        </p:txBody>
-      </p:sp>
-      <p:sp>
-        <p:nvSpPr>
-          <p:cNvPr id="3" name="Content Placeholder 2">
-            <a:extLst>
-              <a:ext uri="{FF2B5EF4-FFF2-40B4-BE49-F238E27FC236}">
-                <a16:creationId xmlns:a16="http://schemas.microsoft.com/office/drawing/2014/main" id="{891C7693-D3DF-4635-96F4-97F3B4136FDF}"/>
-              </a:ext>
-            </a:extLst>
-          </p:cNvPr>
-          <p:cNvSpPr>
-            <a:spLocks noGrp="1"/>
-          </p:cNvSpPr>
-          <p:nvPr>
-            <p:ph idx="1"/>
-          </p:nvPr>
-        </p:nvSpPr>
-        <p:spPr/>
-        <p:txBody>
-          <a:bodyPr/>
-          <a:lstStyle/>
-          <a:p>
-            <a:r>
-              <a:rPr lang="en-US" dirty="0">
-                <a:latin typeface="Euclid Circular B" panose="020B0504000000000000" pitchFamily="34" charset="0"/>
-                <a:ea typeface="Euclid Circular B" panose="020B0504000000000000" pitchFamily="34" charset="0"/>
-              </a:rPr>
-              <a:t>Content</a:t>
-            </a:r>
-          </a:p>
-        </p:txBody>
-      </p:sp>
+              <a:t>Imaging: Services (Abstractions)</a:t>
+            </a:r>
+            <a:endParaRPr lang="en-US" b="1" dirty="0">
+              <a:solidFill>
+                <a:srgbClr val="292D33"/>
+              </a:solidFill>
+              <a:latin typeface="Euclid Circular B" panose="020B0504000000000000" pitchFamily="34" charset="0"/>
+              <a:ea typeface="Euclid Circular B" panose="020B0504000000000000" pitchFamily="34" charset="0"/>
+            </a:endParaRPr>
+          </a:p>
+        </p:txBody>
+      </p:sp>
+      <p:pic>
+        <p:nvPicPr>
+          <p:cNvPr id="7" name="Picture 6">
+            <a:extLst>
+              <a:ext uri="{FF2B5EF4-FFF2-40B4-BE49-F238E27FC236}">
+                <a16:creationId xmlns:a16="http://schemas.microsoft.com/office/drawing/2014/main" id="{B8AD2895-B9E3-8B73-A509-3E132B5EEC47}"/>
+              </a:ext>
+            </a:extLst>
+          </p:cNvPr>
+          <p:cNvPicPr>
+            <a:picLocks noChangeAspect="1"/>
+          </p:cNvPicPr>
+          <p:nvPr/>
+        </p:nvPicPr>
+        <p:blipFill>
+          <a:blip r:embed="rId3"/>
+          <a:stretch>
+            <a:fillRect/>
+          </a:stretch>
+        </p:blipFill>
+        <p:spPr>
+          <a:xfrm>
+            <a:off x="838200" y="1690688"/>
+            <a:ext cx="4856610" cy="3930884"/>
+          </a:xfrm>
+          <a:prstGeom prst="rect">
+            <a:avLst/>
+          </a:prstGeom>
+        </p:spPr>
+      </p:pic>
+      <p:pic>
+        <p:nvPicPr>
+          <p:cNvPr id="9" name="Picture 8">
+            <a:extLst>
+              <a:ext uri="{FF2B5EF4-FFF2-40B4-BE49-F238E27FC236}">
+                <a16:creationId xmlns:a16="http://schemas.microsoft.com/office/drawing/2014/main" id="{38415C36-A45E-EB4B-1B8B-7B0D387CDA7F}"/>
+              </a:ext>
+            </a:extLst>
+          </p:cNvPr>
+          <p:cNvPicPr>
+            <a:picLocks noChangeAspect="1"/>
+          </p:cNvPicPr>
+          <p:nvPr/>
+        </p:nvPicPr>
+        <p:blipFill>
+          <a:blip r:embed="rId4"/>
+          <a:stretch>
+            <a:fillRect/>
+          </a:stretch>
+        </p:blipFill>
+        <p:spPr>
+          <a:xfrm>
+            <a:off x="6172297" y="1690688"/>
+            <a:ext cx="5528295" cy="3930884"/>
+          </a:xfrm>
+          <a:prstGeom prst="rect">
+            <a:avLst/>
+          </a:prstGeom>
+        </p:spPr>
+      </p:pic>
     </p:spTree>
     <p:extLst>
       <p:ext uri="{BB962C8B-B14F-4D97-AF65-F5344CB8AC3E}">
-        <p14:creationId xmlns:p14="http://schemas.microsoft.com/office/powerpoint/2010/main" val="3402276886"/>
+        <p14:creationId xmlns:p14="http://schemas.microsoft.com/office/powerpoint/2010/main" val="795882860"/>
       </p:ext>
     </p:extLst>
   </p:cSld>
   <p:clrMapOvr>
     <a:masterClrMapping/>
   </p:clrMapOvr>
+  <p:timing>
+    <p:tnLst>
+      <p:par>
+        <p:cTn id="1" dur="indefinite" restart="never" nodeType="tmRoot">
+          <p:childTnLst>
+            <p:seq concurrent="1" nextAc="seek">
+              <p:cTn id="2" dur="indefinite" nodeType="mainSeq">
+                <p:childTnLst>
+                  <p:par>
+                    <p:cTn id="3" fill="hold">
+                      <p:stCondLst>
+                        <p:cond delay="indefinite"/>
+                      </p:stCondLst>
+                      <p:childTnLst>
+                        <p:par>
+                          <p:cTn id="4" fill="hold">
+                            <p:stCondLst>
+                              <p:cond delay="0"/>
+                            </p:stCondLst>
+                            <p:childTnLst>
+                              <p:par>
+                                <p:cTn id="5" presetID="10" presetClass="entr" presetSubtype="0" fill="hold" nodeType="clickEffect">
+                                  <p:stCondLst>
+                                    <p:cond delay="0"/>
+                                  </p:stCondLst>
+                                  <p:childTnLst>
+                                    <p:set>
+                                      <p:cBhvr>
+                                        <p:cTn id="6" dur="1" fill="hold">
+                                          <p:stCondLst>
+                                            <p:cond delay="0"/>
+                                          </p:stCondLst>
+                                        </p:cTn>
+                                        <p:tgtEl>
+                                          <p:spTgt spid="7"/>
+                                        </p:tgtEl>
+                                        <p:attrNameLst>
+                                          <p:attrName>style.visibility</p:attrName>
+                                        </p:attrNameLst>
+                                      </p:cBhvr>
+                                      <p:to>
+                                        <p:strVal val="visible"/>
+                                      </p:to>
+                                    </p:set>
+                                    <p:animEffect transition="in" filter="fade">
+                                      <p:cBhvr>
+                                        <p:cTn id="7" dur="500"/>
+                                        <p:tgtEl>
+                                          <p:spTgt spid="7"/>
+                                        </p:tgtEl>
+                                      </p:cBhvr>
+                                    </p:animEffect>
+                                  </p:childTnLst>
+                                </p:cTn>
+                              </p:par>
+                            </p:childTnLst>
+                          </p:cTn>
+                        </p:par>
+                      </p:childTnLst>
+                    </p:cTn>
+                  </p:par>
+                  <p:par>
+                    <p:cTn id="8" fill="hold">
+                      <p:stCondLst>
+                        <p:cond delay="indefinite"/>
+                      </p:stCondLst>
+                      <p:childTnLst>
+                        <p:par>
+                          <p:cTn id="9" fill="hold">
+                            <p:stCondLst>
+                              <p:cond delay="0"/>
+                            </p:stCondLst>
+                            <p:childTnLst>
+                              <p:par>
+                                <p:cTn id="10" presetID="10" presetClass="entr" presetSubtype="0" fill="hold" nodeType="clickEffect">
+                                  <p:stCondLst>
+                                    <p:cond delay="0"/>
+                                  </p:stCondLst>
+                                  <p:childTnLst>
+                                    <p:set>
+                                      <p:cBhvr>
+                                        <p:cTn id="11" dur="1" fill="hold">
+                                          <p:stCondLst>
+                                            <p:cond delay="0"/>
+                                          </p:stCondLst>
+                                        </p:cTn>
+                                        <p:tgtEl>
+                                          <p:spTgt spid="9"/>
+                                        </p:tgtEl>
+                                        <p:attrNameLst>
+                                          <p:attrName>style.visibility</p:attrName>
+                                        </p:attrNameLst>
+                                      </p:cBhvr>
+                                      <p:to>
+                                        <p:strVal val="visible"/>
+                                      </p:to>
+                                    </p:set>
+                                    <p:animEffect transition="in" filter="fade">
+                                      <p:cBhvr>
+                                        <p:cTn id="12" dur="500"/>
+                                        <p:tgtEl>
+                                          <p:spTgt spid="9"/>
+                                        </p:tgtEl>
+                                      </p:cBhvr>
+                                    </p:animEffect>
+                                  </p:childTnLst>
+                                </p:cTn>
+                              </p:par>
+                            </p:childTnLst>
+                          </p:cTn>
+                        </p:par>
+                      </p:childTnLst>
+                    </p:cTn>
+                  </p:par>
+                </p:childTnLst>
+              </p:cTn>
+              <p:prevCondLst>
+                <p:cond evt="onPrev" delay="0">
+                  <p:tgtEl>
+                    <p:sldTgt/>
+                  </p:tgtEl>
+                </p:cond>
+              </p:prevCondLst>
+              <p:nextCondLst>
+                <p:cond evt="onNext" delay="0">
+                  <p:tgtEl>
+                    <p:sldTgt/>
+                  </p:tgtEl>
+                </p:cond>
+              </p:nextCondLst>
+            </p:seq>
+          </p:childTnLst>
+        </p:cTn>
+      </p:par>
+    </p:tnLst>
+  </p:timing>
 </p:sld>
 </file>
 
@@ -3837,53 +5883,59 @@
           <a:lstStyle/>
           <a:p>
             <a:r>
-              <a:rPr lang="en-US" b="1" dirty="0">
+              <a:rPr lang="tr-TR" b="1" dirty="0">
                 <a:solidFill>
                   <a:srgbClr val="292D33"/>
                 </a:solidFill>
                 <a:latin typeface="Euclid Circular B" panose="020B0504000000000000" pitchFamily="34" charset="0"/>
                 <a:ea typeface="Euclid Circular B" panose="020B0504000000000000" pitchFamily="34" charset="0"/>
               </a:rPr>
-              <a:t>Topic title</a:t>
-            </a:r>
-          </a:p>
-        </p:txBody>
-      </p:sp>
-      <p:sp>
-        <p:nvSpPr>
-          <p:cNvPr id="3" name="Content Placeholder 2">
-            <a:extLst>
-              <a:ext uri="{FF2B5EF4-FFF2-40B4-BE49-F238E27FC236}">
-                <a16:creationId xmlns:a16="http://schemas.microsoft.com/office/drawing/2014/main" id="{891C7693-D3DF-4635-96F4-97F3B4136FDF}"/>
-              </a:ext>
-            </a:extLst>
-          </p:cNvPr>
-          <p:cNvSpPr>
-            <a:spLocks noGrp="1"/>
-          </p:cNvSpPr>
-          <p:nvPr>
-            <p:ph idx="1"/>
-          </p:nvPr>
-        </p:nvSpPr>
-        <p:spPr/>
-        <p:txBody>
-          <a:bodyPr/>
-          <a:lstStyle/>
-          <a:p>
-            <a:r>
-              <a:rPr lang="en-US" dirty="0">
-                <a:latin typeface="Euclid Circular B" panose="020B0504000000000000" pitchFamily="34" charset="0"/>
-                <a:ea typeface="Euclid Circular B" panose="020B0504000000000000" pitchFamily="34" charset="0"/>
-              </a:rPr>
-              <a:t>Content</a:t>
-            </a:r>
-          </a:p>
-        </p:txBody>
-      </p:sp>
+              <a:t>Imaging: ASP.NET Core Action Filters</a:t>
+            </a:r>
+            <a:endParaRPr lang="en-US" b="1" dirty="0">
+              <a:solidFill>
+                <a:srgbClr val="292D33"/>
+              </a:solidFill>
+              <a:latin typeface="Euclid Circular B" panose="020B0504000000000000" pitchFamily="34" charset="0"/>
+              <a:ea typeface="Euclid Circular B" panose="020B0504000000000000" pitchFamily="34" charset="0"/>
+            </a:endParaRPr>
+          </a:p>
+        </p:txBody>
+      </p:sp>
+      <p:pic>
+        <p:nvPicPr>
+          <p:cNvPr id="7" name="Picture 6">
+            <a:extLst>
+              <a:ext uri="{FF2B5EF4-FFF2-40B4-BE49-F238E27FC236}">
+                <a16:creationId xmlns:a16="http://schemas.microsoft.com/office/drawing/2014/main" id="{85AADF2B-BD96-50E9-2611-C55F598C58F8}"/>
+              </a:ext>
+            </a:extLst>
+          </p:cNvPr>
+          <p:cNvPicPr>
+            <a:picLocks noChangeAspect="1"/>
+          </p:cNvPicPr>
+          <p:nvPr/>
+        </p:nvPicPr>
+        <p:blipFill>
+          <a:blip r:embed="rId3"/>
+          <a:stretch>
+            <a:fillRect/>
+          </a:stretch>
+        </p:blipFill>
+        <p:spPr>
+          <a:xfrm>
+            <a:off x="838200" y="1690688"/>
+            <a:ext cx="8796250" cy="4050154"/>
+          </a:xfrm>
+          <a:prstGeom prst="rect">
+            <a:avLst/>
+          </a:prstGeom>
+        </p:spPr>
+      </p:pic>
     </p:spTree>
     <p:extLst>
       <p:ext uri="{BB962C8B-B14F-4D97-AF65-F5344CB8AC3E}">
-        <p14:creationId xmlns:p14="http://schemas.microsoft.com/office/powerpoint/2010/main" val="3491056246"/>
+        <p14:creationId xmlns:p14="http://schemas.microsoft.com/office/powerpoint/2010/main" val="3402276886"/>
       </p:ext>
     </p:extLst>
   </p:cSld>
@@ -3946,15 +5998,22 @@
           <a:lstStyle/>
           <a:p>
             <a:r>
-              <a:rPr lang="en-US" b="1" dirty="0">
+              <a:rPr lang="tr-TR" b="1" dirty="0">
                 <a:solidFill>
                   <a:srgbClr val="292D33"/>
                 </a:solidFill>
                 <a:latin typeface="Euclid Circular B" panose="020B0504000000000000" pitchFamily="34" charset="0"/>
                 <a:ea typeface="Euclid Circular B" panose="020B0504000000000000" pitchFamily="34" charset="0"/>
               </a:rPr>
-              <a:t>Topic title</a:t>
-            </a:r>
+              <a:t>Script Nonce Attribute</a:t>
+            </a:r>
+            <a:endParaRPr lang="en-US" b="1" dirty="0">
+              <a:solidFill>
+                <a:srgbClr val="292D33"/>
+              </a:solidFill>
+              <a:latin typeface="Euclid Circular B" panose="020B0504000000000000" pitchFamily="34" charset="0"/>
+              <a:ea typeface="Euclid Circular B" panose="020B0504000000000000" pitchFamily="34" charset="0"/>
+            </a:endParaRPr>
           </a:p>
         </p:txBody>
       </p:sp>
@@ -3980,19 +6039,32 @@
           <a:lstStyle/>
           <a:p>
             <a:r>
-              <a:rPr lang="en-US" dirty="0">
+              <a:rPr lang="tr-TR" dirty="0">
                 <a:latin typeface="Euclid Circular B" panose="020B0504000000000000" pitchFamily="34" charset="0"/>
                 <a:ea typeface="Euclid Circular B" panose="020B0504000000000000" pitchFamily="34" charset="0"/>
               </a:rPr>
-              <a:t>Content</a:t>
-            </a:r>
+              <a:t>Explicitly allow the scripts to be executed in your application.</a:t>
+            </a:r>
+          </a:p>
+          <a:p>
+            <a:r>
+              <a:rPr lang="tr-TR" dirty="0">
+                <a:latin typeface="Euclid Circular B" panose="020B0504000000000000" pitchFamily="34" charset="0"/>
+                <a:ea typeface="Euclid Circular B" panose="020B0504000000000000" pitchFamily="34" charset="0"/>
+              </a:rPr>
+              <a:t>Disallow all others to prevent XSS attacks.</a:t>
+            </a:r>
+            <a:endParaRPr lang="en-US" dirty="0">
+              <a:latin typeface="Euclid Circular B" panose="020B0504000000000000" pitchFamily="34" charset="0"/>
+              <a:ea typeface="Euclid Circular B" panose="020B0504000000000000" pitchFamily="34" charset="0"/>
+            </a:endParaRPr>
           </a:p>
         </p:txBody>
       </p:sp>
     </p:spTree>
     <p:extLst>
       <p:ext uri="{BB962C8B-B14F-4D97-AF65-F5344CB8AC3E}">
-        <p14:creationId xmlns:p14="http://schemas.microsoft.com/office/powerpoint/2010/main" val="687381223"/>
+        <p14:creationId xmlns:p14="http://schemas.microsoft.com/office/powerpoint/2010/main" val="3491056246"/>
       </p:ext>
     </p:extLst>
   </p:cSld>
@@ -4055,53 +6127,59 @@
           <a:lstStyle/>
           <a:p>
             <a:r>
-              <a:rPr lang="en-US" b="1" dirty="0">
+              <a:rPr lang="tr-TR" b="1">
                 <a:solidFill>
                   <a:srgbClr val="292D33"/>
                 </a:solidFill>
                 <a:latin typeface="Euclid Circular B" panose="020B0504000000000000" pitchFamily="34" charset="0"/>
                 <a:ea typeface="Euclid Circular B" panose="020B0504000000000000" pitchFamily="34" charset="0"/>
               </a:rPr>
-              <a:t>Topic title</a:t>
-            </a:r>
-          </a:p>
-        </p:txBody>
-      </p:sp>
-      <p:sp>
-        <p:nvSpPr>
-          <p:cNvPr id="3" name="Content Placeholder 2">
-            <a:extLst>
-              <a:ext uri="{FF2B5EF4-FFF2-40B4-BE49-F238E27FC236}">
-                <a16:creationId xmlns:a16="http://schemas.microsoft.com/office/drawing/2014/main" id="{891C7693-D3DF-4635-96F4-97F3B4136FDF}"/>
-              </a:ext>
-            </a:extLst>
-          </p:cNvPr>
-          <p:cNvSpPr>
-            <a:spLocks noGrp="1"/>
-          </p:cNvSpPr>
-          <p:nvPr>
-            <p:ph idx="1"/>
-          </p:nvPr>
-        </p:nvSpPr>
-        <p:spPr/>
-        <p:txBody>
-          <a:bodyPr/>
-          <a:lstStyle/>
-          <a:p>
-            <a:r>
-              <a:rPr lang="en-US" dirty="0">
-                <a:latin typeface="Euclid Circular B" panose="020B0504000000000000" pitchFamily="34" charset="0"/>
-                <a:ea typeface="Euclid Circular B" panose="020B0504000000000000" pitchFamily="34" charset="0"/>
-              </a:rPr>
-              <a:t>Content</a:t>
-            </a:r>
-          </a:p>
-        </p:txBody>
-      </p:sp>
+              <a:t>Listening to Distributed Events</a:t>
+            </a:r>
+            <a:endParaRPr lang="en-US" b="1" dirty="0">
+              <a:solidFill>
+                <a:srgbClr val="292D33"/>
+              </a:solidFill>
+              <a:latin typeface="Euclid Circular B" panose="020B0504000000000000" pitchFamily="34" charset="0"/>
+              <a:ea typeface="Euclid Circular B" panose="020B0504000000000000" pitchFamily="34" charset="0"/>
+            </a:endParaRPr>
+          </a:p>
+        </p:txBody>
+      </p:sp>
+      <p:pic>
+        <p:nvPicPr>
+          <p:cNvPr id="7" name="Picture 6">
+            <a:extLst>
+              <a:ext uri="{FF2B5EF4-FFF2-40B4-BE49-F238E27FC236}">
+                <a16:creationId xmlns:a16="http://schemas.microsoft.com/office/drawing/2014/main" id="{F3DED838-5F89-1E1E-06C7-17102537D711}"/>
+              </a:ext>
+            </a:extLst>
+          </p:cNvPr>
+          <p:cNvPicPr>
+            <a:picLocks noChangeAspect="1"/>
+          </p:cNvPicPr>
+          <p:nvPr/>
+        </p:nvPicPr>
+        <p:blipFill>
+          <a:blip r:embed="rId3"/>
+          <a:stretch>
+            <a:fillRect/>
+          </a:stretch>
+        </p:blipFill>
+        <p:spPr>
+          <a:xfrm>
+            <a:off x="838200" y="1690688"/>
+            <a:ext cx="8227903" cy="4730484"/>
+          </a:xfrm>
+          <a:prstGeom prst="rect">
+            <a:avLst/>
+          </a:prstGeom>
+        </p:spPr>
+      </p:pic>
     </p:spTree>
     <p:extLst>
       <p:ext uri="{BB962C8B-B14F-4D97-AF65-F5344CB8AC3E}">
-        <p14:creationId xmlns:p14="http://schemas.microsoft.com/office/powerpoint/2010/main" val="522563009"/>
+        <p14:creationId xmlns:p14="http://schemas.microsoft.com/office/powerpoint/2010/main" val="687381223"/>
       </p:ext>
     </p:extLst>
   </p:cSld>
@@ -4164,15 +6242,22 @@
           <a:lstStyle/>
           <a:p>
             <a:r>
-              <a:rPr lang="en-US" b="1" dirty="0">
+              <a:rPr lang="tr-TR" b="1" dirty="0">
                 <a:solidFill>
                   <a:srgbClr val="292D33"/>
                 </a:solidFill>
                 <a:latin typeface="Euclid Circular B" panose="020B0504000000000000" pitchFamily="34" charset="0"/>
                 <a:ea typeface="Euclid Circular B" panose="020B0504000000000000" pitchFamily="34" charset="0"/>
               </a:rPr>
-              <a:t>Topic title</a:t>
-            </a:r>
+              <a:t>LocalEventHandlerOrder Attribute</a:t>
+            </a:r>
+            <a:endParaRPr lang="en-US" b="1" dirty="0">
+              <a:solidFill>
+                <a:srgbClr val="292D33"/>
+              </a:solidFill>
+              <a:latin typeface="Euclid Circular B" panose="020B0504000000000000" pitchFamily="34" charset="0"/>
+              <a:ea typeface="Euclid Circular B" panose="020B0504000000000000" pitchFamily="34" charset="0"/>
+            </a:endParaRPr>
           </a:p>
         </p:txBody>
       </p:sp>
@@ -4207,10 +6292,40 @@
           </a:p>
         </p:txBody>
       </p:sp>
+      <p:pic>
+        <p:nvPicPr>
+          <p:cNvPr id="5" name="Picture 4">
+            <a:extLst>
+              <a:ext uri="{FF2B5EF4-FFF2-40B4-BE49-F238E27FC236}">
+                <a16:creationId xmlns:a16="http://schemas.microsoft.com/office/drawing/2014/main" id="{635B9ED1-1929-5FAB-ED1E-5724AAEF51E2}"/>
+              </a:ext>
+            </a:extLst>
+          </p:cNvPr>
+          <p:cNvPicPr>
+            <a:picLocks noChangeAspect="1"/>
+          </p:cNvPicPr>
+          <p:nvPr/>
+        </p:nvPicPr>
+        <p:blipFill>
+          <a:blip r:embed="rId3"/>
+          <a:stretch>
+            <a:fillRect/>
+          </a:stretch>
+        </p:blipFill>
+        <p:spPr>
+          <a:xfrm>
+            <a:off x="566737" y="1866900"/>
+            <a:ext cx="11058525" cy="3124200"/>
+          </a:xfrm>
+          <a:prstGeom prst="rect">
+            <a:avLst/>
+          </a:prstGeom>
+        </p:spPr>
+      </p:pic>
     </p:spTree>
     <p:extLst>
       <p:ext uri="{BB962C8B-B14F-4D97-AF65-F5344CB8AC3E}">
-        <p14:creationId xmlns:p14="http://schemas.microsoft.com/office/powerpoint/2010/main" val="1545391732"/>
+        <p14:creationId xmlns:p14="http://schemas.microsoft.com/office/powerpoint/2010/main" val="522563009"/>
       </p:ext>
     </p:extLst>
   </p:cSld>
@@ -4273,53 +6388,59 @@
           <a:lstStyle/>
           <a:p>
             <a:r>
-              <a:rPr lang="en-US" b="1" dirty="0">
+              <a:rPr lang="tr-TR" b="1" dirty="0">
                 <a:solidFill>
                   <a:srgbClr val="292D33"/>
                 </a:solidFill>
                 <a:latin typeface="Euclid Circular B" panose="020B0504000000000000" pitchFamily="34" charset="0"/>
                 <a:ea typeface="Euclid Circular B" panose="020B0504000000000000" pitchFamily="34" charset="0"/>
               </a:rPr>
-              <a:t>Topic title</a:t>
-            </a:r>
-          </a:p>
-        </p:txBody>
-      </p:sp>
-      <p:sp>
-        <p:nvSpPr>
-          <p:cNvPr id="3" name="Content Placeholder 2">
-            <a:extLst>
-              <a:ext uri="{FF2B5EF4-FFF2-40B4-BE49-F238E27FC236}">
-                <a16:creationId xmlns:a16="http://schemas.microsoft.com/office/drawing/2014/main" id="{891C7693-D3DF-4635-96F4-97F3B4136FDF}"/>
-              </a:ext>
-            </a:extLst>
-          </p:cNvPr>
-          <p:cNvSpPr>
-            <a:spLocks noGrp="1"/>
-          </p:cNvSpPr>
-          <p:nvPr>
-            <p:ph idx="1"/>
-          </p:nvPr>
-        </p:nvSpPr>
-        <p:spPr/>
-        <p:txBody>
-          <a:bodyPr/>
-          <a:lstStyle/>
-          <a:p>
-            <a:r>
-              <a:rPr lang="en-US" dirty="0">
-                <a:latin typeface="Euclid Circular B" panose="020B0504000000000000" pitchFamily="34" charset="0"/>
-                <a:ea typeface="Euclid Circular B" panose="020B0504000000000000" pitchFamily="34" charset="0"/>
-              </a:rPr>
-              <a:t>Content</a:t>
-            </a:r>
-          </a:p>
-        </p:txBody>
-      </p:sp>
+              <a:t>ABP CLI: switch-to-local</a:t>
+            </a:r>
+            <a:endParaRPr lang="en-US" b="1" dirty="0">
+              <a:solidFill>
+                <a:srgbClr val="292D33"/>
+              </a:solidFill>
+              <a:latin typeface="Euclid Circular B" panose="020B0504000000000000" pitchFamily="34" charset="0"/>
+              <a:ea typeface="Euclid Circular B" panose="020B0504000000000000" pitchFamily="34" charset="0"/>
+            </a:endParaRPr>
+          </a:p>
+        </p:txBody>
+      </p:sp>
+      <p:pic>
+        <p:nvPicPr>
+          <p:cNvPr id="5" name="Picture 4">
+            <a:extLst>
+              <a:ext uri="{FF2B5EF4-FFF2-40B4-BE49-F238E27FC236}">
+                <a16:creationId xmlns:a16="http://schemas.microsoft.com/office/drawing/2014/main" id="{7103785D-4B1C-F19C-0755-DC5B9C42A485}"/>
+              </a:ext>
+            </a:extLst>
+          </p:cNvPr>
+          <p:cNvPicPr>
+            <a:picLocks noChangeAspect="1"/>
+          </p:cNvPicPr>
+          <p:nvPr/>
+        </p:nvPicPr>
+        <p:blipFill>
+          <a:blip r:embed="rId3"/>
+          <a:stretch>
+            <a:fillRect/>
+          </a:stretch>
+        </p:blipFill>
+        <p:spPr>
+          <a:xfrm>
+            <a:off x="838200" y="1690688"/>
+            <a:ext cx="7778654" cy="4837471"/>
+          </a:xfrm>
+          <a:prstGeom prst="rect">
+            <a:avLst/>
+          </a:prstGeom>
+        </p:spPr>
+      </p:pic>
     </p:spTree>
     <p:extLst>
       <p:ext uri="{BB962C8B-B14F-4D97-AF65-F5344CB8AC3E}">
-        <p14:creationId xmlns:p14="http://schemas.microsoft.com/office/powerpoint/2010/main" val="781682869"/>
+        <p14:creationId xmlns:p14="http://schemas.microsoft.com/office/powerpoint/2010/main" val="1545391732"/>
       </p:ext>
     </p:extLst>
   </p:cSld>

</xml_diff>